<commit_message>
added layers and intro slides and text
</commit_message>
<xml_diff>
--- a/IntroToArchitecture.pptx
+++ b/IntroToArchitecture.pptx
@@ -6,8 +6,16 @@
   </p:sldMasterIdLst>
   <p:sldIdLst>
     <p:sldId id="256" r:id="rId2"/>
-    <p:sldId id="257" r:id="rId3"/>
-    <p:sldId id="258" r:id="rId4"/>
+    <p:sldId id="265" r:id="rId3"/>
+    <p:sldId id="266" r:id="rId4"/>
+    <p:sldId id="257" r:id="rId5"/>
+    <p:sldId id="258" r:id="rId6"/>
+    <p:sldId id="260" r:id="rId7"/>
+    <p:sldId id="259" r:id="rId8"/>
+    <p:sldId id="261" r:id="rId9"/>
+    <p:sldId id="262" r:id="rId10"/>
+    <p:sldId id="263" r:id="rId11"/>
+    <p:sldId id="264" r:id="rId12"/>
   </p:sldIdLst>
   <p:sldSz cx="9144000" cy="6858000" type="screen4x3"/>
   <p:notesSz cx="6858000" cy="9144000"/>
@@ -290,7 +298,8 @@
           <a:p>
             <a:fld id="{9E579FCD-C7FB-4CDF-8CA4-138E1F44076D}" type="datetimeFigureOut">
               <a:rPr lang="pl-PL" smtClean="0"/>
-              <a:t>2013-12-09</a:t>
+              <a:pPr/>
+              <a:t>2013-12-10</a:t>
             </a:fld>
             <a:endParaRPr lang="pl-PL"/>
           </a:p>
@@ -332,6 +341,7 @@
           <a:p>
             <a:fld id="{4D02397D-D47C-416B-98D0-9EE863D55FCB}" type="slidenum">
               <a:rPr lang="pl-PL" smtClean="0"/>
+              <a:pPr/>
               <a:t>‹#›</a:t>
             </a:fld>
             <a:endParaRPr lang="pl-PL"/>
@@ -455,7 +465,8 @@
           <a:p>
             <a:fld id="{9E579FCD-C7FB-4CDF-8CA4-138E1F44076D}" type="datetimeFigureOut">
               <a:rPr lang="pl-PL" smtClean="0"/>
-              <a:t>2013-12-09</a:t>
+              <a:pPr/>
+              <a:t>2013-12-10</a:t>
             </a:fld>
             <a:endParaRPr lang="pl-PL"/>
           </a:p>
@@ -497,6 +508,7 @@
           <a:p>
             <a:fld id="{4D02397D-D47C-416B-98D0-9EE863D55FCB}" type="slidenum">
               <a:rPr lang="pl-PL" smtClean="0"/>
+              <a:pPr/>
               <a:t>‹#›</a:t>
             </a:fld>
             <a:endParaRPr lang="pl-PL"/>
@@ -630,7 +642,8 @@
           <a:p>
             <a:fld id="{9E579FCD-C7FB-4CDF-8CA4-138E1F44076D}" type="datetimeFigureOut">
               <a:rPr lang="pl-PL" smtClean="0"/>
-              <a:t>2013-12-09</a:t>
+              <a:pPr/>
+              <a:t>2013-12-10</a:t>
             </a:fld>
             <a:endParaRPr lang="pl-PL"/>
           </a:p>
@@ -672,6 +685,7 @@
           <a:p>
             <a:fld id="{4D02397D-D47C-416B-98D0-9EE863D55FCB}" type="slidenum">
               <a:rPr lang="pl-PL" smtClean="0"/>
+              <a:pPr/>
               <a:t>‹#›</a:t>
             </a:fld>
             <a:endParaRPr lang="pl-PL"/>
@@ -795,7 +809,8 @@
           <a:p>
             <a:fld id="{9E579FCD-C7FB-4CDF-8CA4-138E1F44076D}" type="datetimeFigureOut">
               <a:rPr lang="pl-PL" smtClean="0"/>
-              <a:t>2013-12-09</a:t>
+              <a:pPr/>
+              <a:t>2013-12-10</a:t>
             </a:fld>
             <a:endParaRPr lang="pl-PL"/>
           </a:p>
@@ -837,6 +852,7 @@
           <a:p>
             <a:fld id="{4D02397D-D47C-416B-98D0-9EE863D55FCB}" type="slidenum">
               <a:rPr lang="pl-PL" smtClean="0"/>
+              <a:pPr/>
               <a:t>‹#›</a:t>
             </a:fld>
             <a:endParaRPr lang="pl-PL"/>
@@ -1036,7 +1052,8 @@
           <a:p>
             <a:fld id="{9E579FCD-C7FB-4CDF-8CA4-138E1F44076D}" type="datetimeFigureOut">
               <a:rPr lang="pl-PL" smtClean="0"/>
-              <a:t>2013-12-09</a:t>
+              <a:pPr/>
+              <a:t>2013-12-10</a:t>
             </a:fld>
             <a:endParaRPr lang="pl-PL"/>
           </a:p>
@@ -1078,6 +1095,7 @@
           <a:p>
             <a:fld id="{4D02397D-D47C-416B-98D0-9EE863D55FCB}" type="slidenum">
               <a:rPr lang="pl-PL" smtClean="0"/>
+              <a:pPr/>
               <a:t>‹#›</a:t>
             </a:fld>
             <a:endParaRPr lang="pl-PL"/>
@@ -1319,7 +1337,8 @@
           <a:p>
             <a:fld id="{9E579FCD-C7FB-4CDF-8CA4-138E1F44076D}" type="datetimeFigureOut">
               <a:rPr lang="pl-PL" smtClean="0"/>
-              <a:t>2013-12-09</a:t>
+              <a:pPr/>
+              <a:t>2013-12-10</a:t>
             </a:fld>
             <a:endParaRPr lang="pl-PL"/>
           </a:p>
@@ -1361,6 +1380,7 @@
           <a:p>
             <a:fld id="{4D02397D-D47C-416B-98D0-9EE863D55FCB}" type="slidenum">
               <a:rPr lang="pl-PL" smtClean="0"/>
+              <a:pPr/>
               <a:t>‹#›</a:t>
             </a:fld>
             <a:endParaRPr lang="pl-PL"/>
@@ -1736,7 +1756,8 @@
           <a:p>
             <a:fld id="{9E579FCD-C7FB-4CDF-8CA4-138E1F44076D}" type="datetimeFigureOut">
               <a:rPr lang="pl-PL" smtClean="0"/>
-              <a:t>2013-12-09</a:t>
+              <a:pPr/>
+              <a:t>2013-12-10</a:t>
             </a:fld>
             <a:endParaRPr lang="pl-PL"/>
           </a:p>
@@ -1778,6 +1799,7 @@
           <a:p>
             <a:fld id="{4D02397D-D47C-416B-98D0-9EE863D55FCB}" type="slidenum">
               <a:rPr lang="pl-PL" smtClean="0"/>
+              <a:pPr/>
               <a:t>‹#›</a:t>
             </a:fld>
             <a:endParaRPr lang="pl-PL"/>
@@ -1849,7 +1871,8 @@
           <a:p>
             <a:fld id="{9E579FCD-C7FB-4CDF-8CA4-138E1F44076D}" type="datetimeFigureOut">
               <a:rPr lang="pl-PL" smtClean="0"/>
-              <a:t>2013-12-09</a:t>
+              <a:pPr/>
+              <a:t>2013-12-10</a:t>
             </a:fld>
             <a:endParaRPr lang="pl-PL"/>
           </a:p>
@@ -1891,6 +1914,7 @@
           <a:p>
             <a:fld id="{4D02397D-D47C-416B-98D0-9EE863D55FCB}" type="slidenum">
               <a:rPr lang="pl-PL" smtClean="0"/>
+              <a:pPr/>
               <a:t>‹#›</a:t>
             </a:fld>
             <a:endParaRPr lang="pl-PL"/>
@@ -1939,7 +1963,8 @@
           <a:p>
             <a:fld id="{9E579FCD-C7FB-4CDF-8CA4-138E1F44076D}" type="datetimeFigureOut">
               <a:rPr lang="pl-PL" smtClean="0"/>
-              <a:t>2013-12-09</a:t>
+              <a:pPr/>
+              <a:t>2013-12-10</a:t>
             </a:fld>
             <a:endParaRPr lang="pl-PL"/>
           </a:p>
@@ -1981,6 +2006,7 @@
           <a:p>
             <a:fld id="{4D02397D-D47C-416B-98D0-9EE863D55FCB}" type="slidenum">
               <a:rPr lang="pl-PL" smtClean="0"/>
+              <a:pPr/>
               <a:t>‹#›</a:t>
             </a:fld>
             <a:endParaRPr lang="pl-PL"/>
@@ -2211,7 +2237,8 @@
           <a:p>
             <a:fld id="{9E579FCD-C7FB-4CDF-8CA4-138E1F44076D}" type="datetimeFigureOut">
               <a:rPr lang="pl-PL" smtClean="0"/>
-              <a:t>2013-12-09</a:t>
+              <a:pPr/>
+              <a:t>2013-12-10</a:t>
             </a:fld>
             <a:endParaRPr lang="pl-PL"/>
           </a:p>
@@ -2253,6 +2280,7 @@
           <a:p>
             <a:fld id="{4D02397D-D47C-416B-98D0-9EE863D55FCB}" type="slidenum">
               <a:rPr lang="pl-PL" smtClean="0"/>
+              <a:pPr/>
               <a:t>‹#›</a:t>
             </a:fld>
             <a:endParaRPr lang="pl-PL"/>
@@ -2459,7 +2487,8 @@
           <a:p>
             <a:fld id="{9E579FCD-C7FB-4CDF-8CA4-138E1F44076D}" type="datetimeFigureOut">
               <a:rPr lang="pl-PL" smtClean="0"/>
-              <a:t>2013-12-09</a:t>
+              <a:pPr/>
+              <a:t>2013-12-10</a:t>
             </a:fld>
             <a:endParaRPr lang="pl-PL"/>
           </a:p>
@@ -2501,6 +2530,7 @@
           <a:p>
             <a:fld id="{4D02397D-D47C-416B-98D0-9EE863D55FCB}" type="slidenum">
               <a:rPr lang="pl-PL" smtClean="0"/>
+              <a:pPr/>
               <a:t>‹#›</a:t>
             </a:fld>
             <a:endParaRPr lang="pl-PL"/>
@@ -2667,7 +2697,8 @@
           <a:p>
             <a:fld id="{9E579FCD-C7FB-4CDF-8CA4-138E1F44076D}" type="datetimeFigureOut">
               <a:rPr lang="pl-PL" smtClean="0"/>
-              <a:t>2013-12-09</a:t>
+              <a:pPr/>
+              <a:t>2013-12-10</a:t>
             </a:fld>
             <a:endParaRPr lang="pl-PL"/>
           </a:p>
@@ -2745,6 +2776,7 @@
           <a:p>
             <a:fld id="{4D02397D-D47C-416B-98D0-9EE863D55FCB}" type="slidenum">
               <a:rPr lang="pl-PL" smtClean="0"/>
+              <a:pPr/>
               <a:t>‹#›</a:t>
             </a:fld>
             <a:endParaRPr lang="pl-PL"/>
@@ -3052,7 +3084,11 @@
           <a:bodyPr/>
           <a:lstStyle/>
           <a:p>
-            <a:endParaRPr lang="pl-PL"/>
+            <a:r>
+              <a:rPr lang="pl-PL" dirty="0" smtClean="0"/>
+              <a:t>Architecture concepts</a:t>
+            </a:r>
+            <a:endParaRPr lang="pl-PL" dirty="0"/>
           </a:p>
         </p:txBody>
       </p:sp>
@@ -3072,6 +3108,207 @@
           <a:lstStyle/>
           <a:p>
             <a:endParaRPr lang="pl-PL"/>
+          </a:p>
+        </p:txBody>
+      </p:sp>
+    </p:spTree>
+  </p:cSld>
+  <p:clrMapOvr>
+    <a:masterClrMapping/>
+  </p:clrMapOvr>
+</p:sld>
+</file>
+
+<file path=ppt/slides/slide10.xml><?xml version="1.0" encoding="utf-8"?>
+<p:sld xmlns:a="http://schemas.openxmlformats.org/drawingml/2006/main" xmlns:r="http://schemas.openxmlformats.org/officeDocument/2006/relationships" xmlns:p="http://schemas.openxmlformats.org/presentationml/2006/main">
+  <p:cSld>
+    <p:spTree>
+      <p:nvGrpSpPr>
+        <p:cNvPr id="1" name=""/>
+        <p:cNvGrpSpPr/>
+        <p:nvPr/>
+      </p:nvGrpSpPr>
+      <p:grpSpPr>
+        <a:xfrm>
+          <a:off x="0" y="0"/>
+          <a:ext cx="0" cy="0"/>
+          <a:chOff x="0" y="0"/>
+          <a:chExt cx="0" cy="0"/>
+        </a:xfrm>
+      </p:grpSpPr>
+      <p:sp>
+        <p:nvSpPr>
+          <p:cNvPr id="2" name="Title 1"/>
+          <p:cNvSpPr>
+            <a:spLocks noGrp="1"/>
+          </p:cNvSpPr>
+          <p:nvPr>
+            <p:ph type="title"/>
+          </p:nvPr>
+        </p:nvSpPr>
+        <p:spPr/>
+        <p:txBody>
+          <a:bodyPr/>
+          <a:lstStyle/>
+          <a:p>
+            <a:r>
+              <a:rPr lang="pl-PL" dirty="0" smtClean="0"/>
+              <a:t>Layers implementation</a:t>
+            </a:r>
+            <a:endParaRPr lang="en-US" dirty="0"/>
+          </a:p>
+        </p:txBody>
+      </p:sp>
+      <p:sp>
+        <p:nvSpPr>
+          <p:cNvPr id="3" name="Content Placeholder 2"/>
+          <p:cNvSpPr>
+            <a:spLocks noGrp="1"/>
+          </p:cNvSpPr>
+          <p:nvPr>
+            <p:ph idx="1"/>
+          </p:nvPr>
+        </p:nvSpPr>
+        <p:spPr/>
+        <p:txBody>
+          <a:bodyPr/>
+          <a:lstStyle/>
+          <a:p>
+            <a:r>
+              <a:rPr lang="pl-PL" dirty="0" smtClean="0"/>
+              <a:t>Layers are:</a:t>
+            </a:r>
+          </a:p>
+          <a:p>
+            <a:pPr lvl="1"/>
+            <a:r>
+              <a:rPr lang="pl-PL" sz="2400" dirty="0" smtClean="0"/>
+              <a:t>Scripts / functions </a:t>
+            </a:r>
+          </a:p>
+          <a:p>
+            <a:pPr lvl="1"/>
+            <a:r>
+              <a:rPr lang="pl-PL" sz="2400" dirty="0" smtClean="0"/>
+              <a:t>Classes</a:t>
+            </a:r>
+          </a:p>
+          <a:p>
+            <a:pPr lvl="1"/>
+            <a:r>
+              <a:rPr lang="pl-PL" sz="2400" dirty="0" smtClean="0"/>
+              <a:t>Packages</a:t>
+            </a:r>
+          </a:p>
+          <a:p>
+            <a:r>
+              <a:rPr lang="pl-PL" dirty="0" smtClean="0"/>
+              <a:t>Layer </a:t>
+            </a:r>
+            <a:r>
+              <a:rPr lang="pl-PL" dirty="0" smtClean="0"/>
+              <a:t>affiliation, replacement test</a:t>
+            </a:r>
+          </a:p>
+          <a:p>
+            <a:endParaRPr lang="en-US" dirty="0"/>
+          </a:p>
+        </p:txBody>
+      </p:sp>
+    </p:spTree>
+  </p:cSld>
+  <p:clrMapOvr>
+    <a:masterClrMapping/>
+  </p:clrMapOvr>
+</p:sld>
+</file>
+
+<file path=ppt/slides/slide11.xml><?xml version="1.0" encoding="utf-8"?>
+<p:sld xmlns:a="http://schemas.openxmlformats.org/drawingml/2006/main" xmlns:r="http://schemas.openxmlformats.org/officeDocument/2006/relationships" xmlns:p="http://schemas.openxmlformats.org/presentationml/2006/main">
+  <p:cSld>
+    <p:spTree>
+      <p:nvGrpSpPr>
+        <p:cNvPr id="1" name=""/>
+        <p:cNvGrpSpPr/>
+        <p:nvPr/>
+      </p:nvGrpSpPr>
+      <p:grpSpPr>
+        <a:xfrm>
+          <a:off x="0" y="0"/>
+          <a:ext cx="0" cy="0"/>
+          <a:chOff x="0" y="0"/>
+          <a:chExt cx="0" cy="0"/>
+        </a:xfrm>
+      </p:grpSpPr>
+      <p:sp>
+        <p:nvSpPr>
+          <p:cNvPr id="2" name="Title 1"/>
+          <p:cNvSpPr>
+            <a:spLocks noGrp="1"/>
+          </p:cNvSpPr>
+          <p:nvPr>
+            <p:ph type="title"/>
+          </p:nvPr>
+        </p:nvSpPr>
+        <p:spPr/>
+        <p:txBody>
+          <a:bodyPr/>
+          <a:lstStyle/>
+          <a:p>
+            <a:r>
+              <a:rPr lang="pl-PL" dirty="0" smtClean="0"/>
+              <a:t>Layers distribution</a:t>
+            </a:r>
+            <a:endParaRPr lang="en-US" dirty="0"/>
+          </a:p>
+        </p:txBody>
+      </p:sp>
+      <p:sp>
+        <p:nvSpPr>
+          <p:cNvPr id="3" name="Content Placeholder 2"/>
+          <p:cNvSpPr>
+            <a:spLocks noGrp="1"/>
+          </p:cNvSpPr>
+          <p:nvPr>
+            <p:ph idx="1"/>
+          </p:nvPr>
+        </p:nvSpPr>
+        <p:spPr/>
+        <p:txBody>
+          <a:bodyPr/>
+          <a:lstStyle/>
+          <a:p>
+            <a:r>
+              <a:rPr lang="pl-PL" dirty="0" smtClean="0"/>
+              <a:t>Layers enable physical distribution</a:t>
+            </a:r>
+          </a:p>
+          <a:p>
+            <a:r>
+              <a:rPr lang="pl-PL" dirty="0" smtClean="0"/>
+              <a:t>Clear mapping between functionality and corresponding code </a:t>
+            </a:r>
+          </a:p>
+          <a:p>
+            <a:r>
+              <a:rPr lang="pl-PL" dirty="0" smtClean="0"/>
+              <a:t>Emphasis on </a:t>
+            </a:r>
+            <a:r>
+              <a:rPr lang="pl-PL" dirty="0" smtClean="0"/>
+              <a:t>coarse </a:t>
+            </a:r>
+            <a:r>
+              <a:rPr lang="pl-PL" dirty="0" smtClean="0"/>
+              <a:t>grained, non-distributed domain layer</a:t>
+            </a:r>
+          </a:p>
+          <a:p>
+            <a:r>
+              <a:rPr lang="pl-PL" dirty="0" smtClean="0"/>
+              <a:t>Non-splitted layers between nodes – physical and logical, complexity boosters</a:t>
+            </a:r>
+            <a:endParaRPr lang="en-US" dirty="0"/>
           </a:p>
         </p:txBody>
       </p:sp>
@@ -3084,6 +3321,178 @@
 </file>
 
 <file path=ppt/slides/slide2.xml><?xml version="1.0" encoding="utf-8"?>
+<p:sld xmlns:a="http://schemas.openxmlformats.org/drawingml/2006/main" xmlns:r="http://schemas.openxmlformats.org/officeDocument/2006/relationships" xmlns:p="http://schemas.openxmlformats.org/presentationml/2006/main">
+  <p:cSld>
+    <p:spTree>
+      <p:nvGrpSpPr>
+        <p:cNvPr id="1" name=""/>
+        <p:cNvGrpSpPr/>
+        <p:nvPr/>
+      </p:nvGrpSpPr>
+      <p:grpSpPr>
+        <a:xfrm>
+          <a:off x="0" y="0"/>
+          <a:ext cx="0" cy="0"/>
+          <a:chOff x="0" y="0"/>
+          <a:chExt cx="0" cy="0"/>
+        </a:xfrm>
+      </p:grpSpPr>
+      <p:sp>
+        <p:nvSpPr>
+          <p:cNvPr id="2" name="Title 1"/>
+          <p:cNvSpPr>
+            <a:spLocks noGrp="1"/>
+          </p:cNvSpPr>
+          <p:nvPr>
+            <p:ph type="title"/>
+          </p:nvPr>
+        </p:nvSpPr>
+        <p:spPr/>
+        <p:txBody>
+          <a:bodyPr/>
+          <a:lstStyle/>
+          <a:p>
+            <a:r>
+              <a:rPr lang="pl-PL" dirty="0" smtClean="0"/>
+              <a:t>Architecture</a:t>
+            </a:r>
+            <a:endParaRPr lang="en-US" dirty="0"/>
+          </a:p>
+        </p:txBody>
+      </p:sp>
+      <p:sp>
+        <p:nvSpPr>
+          <p:cNvPr id="3" name="Content Placeholder 2"/>
+          <p:cNvSpPr>
+            <a:spLocks noGrp="1"/>
+          </p:cNvSpPr>
+          <p:nvPr>
+            <p:ph idx="1"/>
+          </p:nvPr>
+        </p:nvSpPr>
+        <p:spPr/>
+        <p:txBody>
+          <a:bodyPr/>
+          <a:lstStyle/>
+          <a:p>
+            <a:r>
+              <a:rPr lang="pl-PL" dirty="0" smtClean="0"/>
+              <a:t>Subjective system’s vision, common definition of components and their interconnections, also:</a:t>
+            </a:r>
+          </a:p>
+          <a:p>
+            <a:r>
+              <a:rPr lang="pl-PL" dirty="0" smtClean="0"/>
+              <a:t>Practices that define software design and decomposition into structures</a:t>
+            </a:r>
+          </a:p>
+        </p:txBody>
+      </p:sp>
+    </p:spTree>
+  </p:cSld>
+  <p:clrMapOvr>
+    <a:masterClrMapping/>
+  </p:clrMapOvr>
+</p:sld>
+</file>
+
+<file path=ppt/slides/slide3.xml><?xml version="1.0" encoding="utf-8"?>
+<p:sld xmlns:a="http://schemas.openxmlformats.org/drawingml/2006/main" xmlns:r="http://schemas.openxmlformats.org/officeDocument/2006/relationships" xmlns:p="http://schemas.openxmlformats.org/presentationml/2006/main">
+  <p:cSld>
+    <p:spTree>
+      <p:nvGrpSpPr>
+        <p:cNvPr id="1" name=""/>
+        <p:cNvGrpSpPr/>
+        <p:nvPr/>
+      </p:nvGrpSpPr>
+      <p:grpSpPr>
+        <a:xfrm>
+          <a:off x="0" y="0"/>
+          <a:ext cx="0" cy="0"/>
+          <a:chOff x="0" y="0"/>
+          <a:chExt cx="0" cy="0"/>
+        </a:xfrm>
+      </p:grpSpPr>
+      <p:sp>
+        <p:nvSpPr>
+          <p:cNvPr id="2" name="Title 1"/>
+          <p:cNvSpPr>
+            <a:spLocks noGrp="1"/>
+          </p:cNvSpPr>
+          <p:nvPr>
+            <p:ph type="title"/>
+          </p:nvPr>
+        </p:nvSpPr>
+        <p:spPr/>
+        <p:txBody>
+          <a:bodyPr/>
+          <a:lstStyle/>
+          <a:p>
+            <a:r>
+              <a:rPr lang="pl-PL" dirty="0" smtClean="0"/>
+              <a:t>Architecture Patterns</a:t>
+            </a:r>
+            <a:endParaRPr lang="en-US" dirty="0"/>
+          </a:p>
+        </p:txBody>
+      </p:sp>
+      <p:sp>
+        <p:nvSpPr>
+          <p:cNvPr id="3" name="Content Placeholder 2"/>
+          <p:cNvSpPr>
+            <a:spLocks noGrp="1"/>
+          </p:cNvSpPr>
+          <p:nvPr>
+            <p:ph idx="1"/>
+          </p:nvPr>
+        </p:nvSpPr>
+        <p:spPr/>
+        <p:txBody>
+          <a:bodyPr/>
+          <a:lstStyle/>
+          <a:p>
+            <a:r>
+              <a:rPr lang="pl-PL" dirty="0" smtClean="0"/>
+              <a:t>Architecture patterns are general, reusable solution to commonly occuring </a:t>
+            </a:r>
+            <a:r>
+              <a:rPr lang="pl-PL" dirty="0" smtClean="0"/>
+              <a:t>problem</a:t>
+            </a:r>
+          </a:p>
+          <a:p>
+            <a:r>
+              <a:rPr lang="pl-PL" dirty="0" smtClean="0"/>
+              <a:t>Help make decisions about architecture</a:t>
+            </a:r>
+          </a:p>
+          <a:p>
+            <a:r>
+              <a:rPr lang="pl-PL" dirty="0" smtClean="0"/>
+              <a:t>Not out-of the box solutions, frequently adjusted to context</a:t>
+            </a:r>
+          </a:p>
+          <a:p>
+            <a:r>
+              <a:rPr lang="pl-PL" dirty="0" smtClean="0"/>
+              <a:t>Dictionary of typical problem-solution or software structures</a:t>
+            </a:r>
+            <a:endParaRPr lang="en-US" dirty="0" smtClean="0"/>
+          </a:p>
+          <a:p>
+            <a:endParaRPr lang="en-US" dirty="0"/>
+          </a:p>
+        </p:txBody>
+      </p:sp>
+    </p:spTree>
+  </p:cSld>
+  <p:clrMapOvr>
+    <a:masterClrMapping/>
+  </p:clrMapOvr>
+</p:sld>
+</file>
+
+<file path=ppt/slides/slide4.xml><?xml version="1.0" encoding="utf-8"?>
 <p:sld xmlns:a="http://schemas.openxmlformats.org/drawingml/2006/main" xmlns:r="http://schemas.openxmlformats.org/officeDocument/2006/relationships" xmlns:p="http://schemas.openxmlformats.org/presentationml/2006/main">
   <p:cSld>
     <p:spTree>
@@ -3178,7 +3587,7 @@
 </p:sld>
 </file>
 
-<file path=ppt/slides/slide3.xml><?xml version="1.0" encoding="utf-8"?>
+<file path=ppt/slides/slide5.xml><?xml version="1.0" encoding="utf-8"?>
 <p:sld xmlns:a="http://schemas.openxmlformats.org/drawingml/2006/main" xmlns:r="http://schemas.openxmlformats.org/officeDocument/2006/relationships" xmlns:p="http://schemas.openxmlformats.org/presentationml/2006/main">
   <p:cSld>
     <p:spTree>
@@ -3251,7 +3660,7 @@
         </p:blipFill>
         <p:spPr bwMode="auto">
           <a:xfrm>
-            <a:off x="1763688" y="1704768"/>
+            <a:off x="1691680" y="1340768"/>
             <a:ext cx="5610200" cy="5021129"/>
           </a:xfrm>
           <a:prstGeom prst="rect">
@@ -3266,11 +3675,945 @@
           </a:ln>
         </p:spPr>
       </p:pic>
+      <p:sp>
+        <p:nvSpPr>
+          <p:cNvPr id="4" name="TextBox 3"/>
+          <p:cNvSpPr txBox="1"/>
+          <p:nvPr/>
+        </p:nvSpPr>
+        <p:spPr>
+          <a:xfrm>
+            <a:off x="467544" y="6453336"/>
+            <a:ext cx="4968552" cy="276999"/>
+          </a:xfrm>
+          <a:prstGeom prst="rect">
+            <a:avLst/>
+          </a:prstGeom>
+          <a:noFill/>
+        </p:spPr>
+        <p:txBody>
+          <a:bodyPr wrap="square" rtlCol="0">
+            <a:spAutoFit/>
+          </a:bodyPr>
+          <a:lstStyle/>
+          <a:p>
+            <a:r>
+              <a:rPr lang="en-US" sz="1200" dirty="0" smtClean="0"/>
+              <a:t>http://en.wikipedia.org/wiki/Multitier_architecture</a:t>
+            </a:r>
+            <a:endParaRPr lang="en-US" sz="1200" dirty="0"/>
+          </a:p>
+        </p:txBody>
+      </p:sp>
     </p:spTree>
   </p:cSld>
   <p:clrMapOvr>
     <a:masterClrMapping/>
   </p:clrMapOvr>
+</p:sld>
+</file>
+
+<file path=ppt/slides/slide6.xml><?xml version="1.0" encoding="utf-8"?>
+<p:sld xmlns:a="http://schemas.openxmlformats.org/drawingml/2006/main" xmlns:r="http://schemas.openxmlformats.org/officeDocument/2006/relationships" xmlns:p="http://schemas.openxmlformats.org/presentationml/2006/main">
+  <p:cSld>
+    <p:spTree>
+      <p:nvGrpSpPr>
+        <p:cNvPr id="1" name=""/>
+        <p:cNvGrpSpPr/>
+        <p:nvPr/>
+      </p:nvGrpSpPr>
+      <p:grpSpPr>
+        <a:xfrm>
+          <a:off x="0" y="0"/>
+          <a:ext cx="0" cy="0"/>
+          <a:chOff x="0" y="0"/>
+          <a:chExt cx="0" cy="0"/>
+        </a:xfrm>
+      </p:grpSpPr>
+      <p:sp>
+        <p:nvSpPr>
+          <p:cNvPr id="2" name="Title 1"/>
+          <p:cNvSpPr>
+            <a:spLocks noGrp="1"/>
+          </p:cNvSpPr>
+          <p:nvPr>
+            <p:ph type="title"/>
+          </p:nvPr>
+        </p:nvSpPr>
+        <p:spPr/>
+        <p:txBody>
+          <a:bodyPr/>
+          <a:lstStyle/>
+          <a:p>
+            <a:r>
+              <a:rPr lang="pl-PL" dirty="0" smtClean="0"/>
+              <a:t>Hexagonal architecture</a:t>
+            </a:r>
+            <a:endParaRPr lang="en-US" dirty="0"/>
+          </a:p>
+        </p:txBody>
+      </p:sp>
+      <p:sp>
+        <p:nvSpPr>
+          <p:cNvPr id="3" name="Content Placeholder 2"/>
+          <p:cNvSpPr>
+            <a:spLocks noGrp="1"/>
+          </p:cNvSpPr>
+          <p:nvPr>
+            <p:ph idx="1"/>
+          </p:nvPr>
+        </p:nvSpPr>
+        <p:spPr>
+          <a:xfrm>
+            <a:off x="457200" y="1600200"/>
+            <a:ext cx="4690864" cy="4421088"/>
+          </a:xfrm>
+        </p:spPr>
+        <p:txBody>
+          <a:bodyPr/>
+          <a:lstStyle/>
+          <a:p>
+            <a:r>
+              <a:rPr lang="en-US" dirty="0" smtClean="0"/>
+              <a:t>avoid layer-to-layer dependencies usually associated with the N-tier architecture </a:t>
+            </a:r>
+            <a:r>
+              <a:rPr lang="en-US" dirty="0" smtClean="0"/>
+              <a:t>approach</a:t>
+            </a:r>
+            <a:r>
+              <a:rPr lang="pl-PL" dirty="0" smtClean="0"/>
+              <a:t> </a:t>
+            </a:r>
+            <a:r>
+              <a:rPr lang="en-US" dirty="0" smtClean="0"/>
+              <a:t>by </a:t>
+            </a:r>
+            <a:r>
+              <a:rPr lang="en-US" dirty="0" smtClean="0"/>
+              <a:t>placing all infrastructure, including databases, outside the problem </a:t>
+            </a:r>
+            <a:r>
+              <a:rPr lang="en-US" dirty="0" smtClean="0"/>
+              <a:t>domain</a:t>
+            </a:r>
+            <a:endParaRPr lang="en-US" dirty="0"/>
+          </a:p>
+        </p:txBody>
+      </p:sp>
+      <p:pic>
+        <p:nvPicPr>
+          <p:cNvPr id="4" name="Picture 2" descr="http://alistair.cockburn.us/get/2301"/>
+          <p:cNvPicPr>
+            <a:picLocks noChangeAspect="1" noChangeArrowheads="1"/>
+          </p:cNvPicPr>
+          <p:nvPr/>
+        </p:nvPicPr>
+        <p:blipFill>
+          <a:blip r:embed="rId2" cstate="print"/>
+          <a:srcRect/>
+          <a:stretch>
+            <a:fillRect/>
+          </a:stretch>
+        </p:blipFill>
+        <p:spPr bwMode="auto">
+          <a:xfrm>
+            <a:off x="5076056" y="2060848"/>
+            <a:ext cx="3409950" cy="2276475"/>
+          </a:xfrm>
+          <a:prstGeom prst="rect">
+            <a:avLst/>
+          </a:prstGeom>
+          <a:noFill/>
+        </p:spPr>
+      </p:pic>
+      <p:sp>
+        <p:nvSpPr>
+          <p:cNvPr id="6" name="TextBox 5"/>
+          <p:cNvSpPr txBox="1"/>
+          <p:nvPr/>
+        </p:nvSpPr>
+        <p:spPr>
+          <a:xfrm>
+            <a:off x="539552" y="5949280"/>
+            <a:ext cx="8208912" cy="276999"/>
+          </a:xfrm>
+          <a:prstGeom prst="rect">
+            <a:avLst/>
+          </a:prstGeom>
+          <a:noFill/>
+        </p:spPr>
+        <p:txBody>
+          <a:bodyPr wrap="square" rtlCol="0">
+            <a:spAutoFit/>
+          </a:bodyPr>
+          <a:lstStyle/>
+          <a:p>
+            <a:r>
+              <a:rPr lang="en-US" sz="1200" dirty="0" smtClean="0"/>
+              <a:t>http://alistair.cockburn.us/Hexagonal+architecture</a:t>
+            </a:r>
+            <a:endParaRPr lang="en-US" sz="1200" dirty="0"/>
+          </a:p>
+        </p:txBody>
+      </p:sp>
+    </p:spTree>
+  </p:cSld>
+  <p:clrMapOvr>
+    <a:masterClrMapping/>
+  </p:clrMapOvr>
+</p:sld>
+</file>
+
+<file path=ppt/slides/slide7.xml><?xml version="1.0" encoding="utf-8"?>
+<p:sld xmlns:a="http://schemas.openxmlformats.org/drawingml/2006/main" xmlns:r="http://schemas.openxmlformats.org/officeDocument/2006/relationships" xmlns:p="http://schemas.openxmlformats.org/presentationml/2006/main">
+  <p:cSld>
+    <p:spTree>
+      <p:nvGrpSpPr>
+        <p:cNvPr id="1" name=""/>
+        <p:cNvGrpSpPr/>
+        <p:nvPr/>
+      </p:nvGrpSpPr>
+      <p:grpSpPr>
+        <a:xfrm>
+          <a:off x="0" y="0"/>
+          <a:ext cx="0" cy="0"/>
+          <a:chOff x="0" y="0"/>
+          <a:chExt cx="0" cy="0"/>
+        </a:xfrm>
+      </p:grpSpPr>
+      <p:sp>
+        <p:nvSpPr>
+          <p:cNvPr id="2" name="Title 1"/>
+          <p:cNvSpPr>
+            <a:spLocks noGrp="1"/>
+          </p:cNvSpPr>
+          <p:nvPr>
+            <p:ph type="title"/>
+          </p:nvPr>
+        </p:nvSpPr>
+        <p:spPr/>
+        <p:txBody>
+          <a:bodyPr/>
+          <a:lstStyle/>
+          <a:p>
+            <a:r>
+              <a:rPr lang="pl-PL" dirty="0" smtClean="0"/>
+              <a:t>Hexagonal architecture</a:t>
+            </a:r>
+            <a:endParaRPr lang="en-US" dirty="0"/>
+          </a:p>
+        </p:txBody>
+      </p:sp>
+      <p:pic>
+        <p:nvPicPr>
+          <p:cNvPr id="1028" name="Picture 4" descr="http://alistair.cockburn.us/get/2302"/>
+          <p:cNvPicPr>
+            <a:picLocks noChangeAspect="1" noChangeArrowheads="1"/>
+          </p:cNvPicPr>
+          <p:nvPr/>
+        </p:nvPicPr>
+        <p:blipFill>
+          <a:blip r:embed="rId2" cstate="print"/>
+          <a:srcRect/>
+          <a:stretch>
+            <a:fillRect/>
+          </a:stretch>
+        </p:blipFill>
+        <p:spPr bwMode="auto">
+          <a:xfrm>
+            <a:off x="1979712" y="1628800"/>
+            <a:ext cx="4638675" cy="3476626"/>
+          </a:xfrm>
+          <a:prstGeom prst="rect">
+            <a:avLst/>
+          </a:prstGeom>
+          <a:noFill/>
+        </p:spPr>
+      </p:pic>
+      <p:sp>
+        <p:nvSpPr>
+          <p:cNvPr id="6" name="TextBox 5"/>
+          <p:cNvSpPr txBox="1"/>
+          <p:nvPr/>
+        </p:nvSpPr>
+        <p:spPr>
+          <a:xfrm>
+            <a:off x="539552" y="5949280"/>
+            <a:ext cx="8208912" cy="276999"/>
+          </a:xfrm>
+          <a:prstGeom prst="rect">
+            <a:avLst/>
+          </a:prstGeom>
+          <a:noFill/>
+        </p:spPr>
+        <p:txBody>
+          <a:bodyPr wrap="square" rtlCol="0">
+            <a:spAutoFit/>
+          </a:bodyPr>
+          <a:lstStyle/>
+          <a:p>
+            <a:r>
+              <a:rPr lang="en-US" sz="1200" dirty="0" smtClean="0"/>
+              <a:t>http://alistair.cockburn.us/Hexagonal+architecture</a:t>
+            </a:r>
+            <a:endParaRPr lang="en-US" sz="1200" dirty="0"/>
+          </a:p>
+        </p:txBody>
+      </p:sp>
+    </p:spTree>
+  </p:cSld>
+  <p:clrMapOvr>
+    <a:masterClrMapping/>
+  </p:clrMapOvr>
+</p:sld>
+</file>
+
+<file path=ppt/slides/slide8.xml><?xml version="1.0" encoding="utf-8"?>
+<p:sld xmlns:a="http://schemas.openxmlformats.org/drawingml/2006/main" xmlns:r="http://schemas.openxmlformats.org/officeDocument/2006/relationships" xmlns:p="http://schemas.openxmlformats.org/presentationml/2006/main">
+  <p:cSld>
+    <p:spTree>
+      <p:nvGrpSpPr>
+        <p:cNvPr id="1" name=""/>
+        <p:cNvGrpSpPr/>
+        <p:nvPr/>
+      </p:nvGrpSpPr>
+      <p:grpSpPr>
+        <a:xfrm>
+          <a:off x="0" y="0"/>
+          <a:ext cx="0" cy="0"/>
+          <a:chOff x="0" y="0"/>
+          <a:chExt cx="0" cy="0"/>
+        </a:xfrm>
+      </p:grpSpPr>
+      <p:sp>
+        <p:nvSpPr>
+          <p:cNvPr id="2" name="Title 1"/>
+          <p:cNvSpPr>
+            <a:spLocks noGrp="1"/>
+          </p:cNvSpPr>
+          <p:nvPr>
+            <p:ph type="title"/>
+          </p:nvPr>
+        </p:nvSpPr>
+        <p:spPr/>
+        <p:txBody>
+          <a:bodyPr/>
+          <a:lstStyle/>
+          <a:p>
+            <a:r>
+              <a:rPr lang="pl-PL" dirty="0" smtClean="0"/>
+              <a:t>Independent domain layering</a:t>
+            </a:r>
+            <a:endParaRPr lang="en-US" dirty="0"/>
+          </a:p>
+        </p:txBody>
+      </p:sp>
+      <p:sp>
+        <p:nvSpPr>
+          <p:cNvPr id="4" name="Rectangle 3"/>
+          <p:cNvSpPr/>
+          <p:nvPr/>
+        </p:nvSpPr>
+        <p:spPr>
+          <a:xfrm>
+            <a:off x="1619672" y="1844824"/>
+            <a:ext cx="5832648" cy="792088"/>
+          </a:xfrm>
+          <a:prstGeom prst="rect">
+            <a:avLst/>
+          </a:prstGeom>
+          <a:solidFill>
+            <a:srgbClr val="0070C0"/>
+          </a:solidFill>
+          <a:ln>
+            <a:solidFill>
+              <a:srgbClr val="0070C0"/>
+            </a:solidFill>
+          </a:ln>
+        </p:spPr>
+        <p:style>
+          <a:lnRef idx="2">
+            <a:schemeClr val="accent1">
+              <a:shade val="50000"/>
+            </a:schemeClr>
+          </a:lnRef>
+          <a:fillRef idx="1">
+            <a:schemeClr val="accent1"/>
+          </a:fillRef>
+          <a:effectRef idx="0">
+            <a:schemeClr val="accent1"/>
+          </a:effectRef>
+          <a:fontRef idx="minor">
+            <a:schemeClr val="lt1"/>
+          </a:fontRef>
+        </p:style>
+        <p:txBody>
+          <a:bodyPr rtlCol="0" anchor="ctr"/>
+          <a:lstStyle/>
+          <a:p>
+            <a:pPr algn="ctr"/>
+            <a:r>
+              <a:rPr lang="pl-PL" dirty="0" smtClean="0"/>
+              <a:t>Presentation</a:t>
+            </a:r>
+            <a:endParaRPr lang="en-US" dirty="0"/>
+          </a:p>
+        </p:txBody>
+      </p:sp>
+      <p:sp>
+        <p:nvSpPr>
+          <p:cNvPr id="8" name="Rectangle 7"/>
+          <p:cNvSpPr/>
+          <p:nvPr/>
+        </p:nvSpPr>
+        <p:spPr>
+          <a:xfrm>
+            <a:off x="1619672" y="3429000"/>
+            <a:ext cx="5832648" cy="792088"/>
+          </a:xfrm>
+          <a:prstGeom prst="rect">
+            <a:avLst/>
+          </a:prstGeom>
+          <a:solidFill>
+            <a:schemeClr val="accent3">
+              <a:lumMod val="75000"/>
+            </a:schemeClr>
+          </a:solidFill>
+          <a:ln>
+            <a:solidFill>
+              <a:schemeClr val="accent3">
+                <a:lumMod val="75000"/>
+              </a:schemeClr>
+            </a:solidFill>
+          </a:ln>
+        </p:spPr>
+        <p:style>
+          <a:lnRef idx="2">
+            <a:schemeClr val="accent1">
+              <a:shade val="50000"/>
+            </a:schemeClr>
+          </a:lnRef>
+          <a:fillRef idx="1">
+            <a:schemeClr val="accent1"/>
+          </a:fillRef>
+          <a:effectRef idx="0">
+            <a:schemeClr val="accent1"/>
+          </a:effectRef>
+          <a:fontRef idx="minor">
+            <a:schemeClr val="lt1"/>
+          </a:fontRef>
+        </p:style>
+        <p:txBody>
+          <a:bodyPr rtlCol="0" anchor="ctr"/>
+          <a:lstStyle/>
+          <a:p>
+            <a:pPr algn="ctr"/>
+            <a:r>
+              <a:rPr lang="pl-PL" dirty="0" smtClean="0"/>
+              <a:t>Domain</a:t>
+            </a:r>
+            <a:endParaRPr lang="en-US" dirty="0"/>
+          </a:p>
+        </p:txBody>
+      </p:sp>
+      <p:sp>
+        <p:nvSpPr>
+          <p:cNvPr id="9" name="Rectangle 8"/>
+          <p:cNvSpPr/>
+          <p:nvPr/>
+        </p:nvSpPr>
+        <p:spPr>
+          <a:xfrm>
+            <a:off x="1619672" y="5013176"/>
+            <a:ext cx="5832648" cy="792088"/>
+          </a:xfrm>
+          <a:prstGeom prst="rect">
+            <a:avLst/>
+          </a:prstGeom>
+          <a:solidFill>
+            <a:srgbClr val="FFC000"/>
+          </a:solidFill>
+          <a:ln>
+            <a:solidFill>
+              <a:srgbClr val="FFC000"/>
+            </a:solidFill>
+          </a:ln>
+        </p:spPr>
+        <p:style>
+          <a:lnRef idx="2">
+            <a:schemeClr val="accent1">
+              <a:shade val="50000"/>
+            </a:schemeClr>
+          </a:lnRef>
+          <a:fillRef idx="1">
+            <a:schemeClr val="accent1"/>
+          </a:fillRef>
+          <a:effectRef idx="0">
+            <a:schemeClr val="accent1"/>
+          </a:effectRef>
+          <a:fontRef idx="minor">
+            <a:schemeClr val="lt1"/>
+          </a:fontRef>
+        </p:style>
+        <p:txBody>
+          <a:bodyPr rtlCol="0" anchor="ctr"/>
+          <a:lstStyle/>
+          <a:p>
+            <a:pPr algn="ctr"/>
+            <a:r>
+              <a:rPr lang="pl-PL" dirty="0" smtClean="0"/>
+              <a:t>Infrastructure</a:t>
+            </a:r>
+            <a:endParaRPr lang="en-US" dirty="0"/>
+          </a:p>
+        </p:txBody>
+      </p:sp>
+      <p:cxnSp>
+        <p:nvCxnSpPr>
+          <p:cNvPr id="11" name="Straight Arrow Connector 10"/>
+          <p:cNvCxnSpPr>
+            <a:stCxn id="4" idx="2"/>
+            <a:endCxn id="8" idx="0"/>
+          </p:cNvCxnSpPr>
+          <p:nvPr/>
+        </p:nvCxnSpPr>
+        <p:spPr>
+          <a:xfrm>
+            <a:off x="4535996" y="2636912"/>
+            <a:ext cx="0" cy="792088"/>
+          </a:xfrm>
+          <a:prstGeom prst="straightConnector1">
+            <a:avLst/>
+          </a:prstGeom>
+          <a:ln w="15875">
+            <a:tailEnd type="arrow"/>
+          </a:ln>
+        </p:spPr>
+        <p:style>
+          <a:lnRef idx="1">
+            <a:schemeClr val="accent1"/>
+          </a:lnRef>
+          <a:fillRef idx="0">
+            <a:schemeClr val="accent1"/>
+          </a:fillRef>
+          <a:effectRef idx="0">
+            <a:schemeClr val="accent1"/>
+          </a:effectRef>
+          <a:fontRef idx="minor">
+            <a:schemeClr val="tx1"/>
+          </a:fontRef>
+        </p:style>
+      </p:cxnSp>
+      <p:cxnSp>
+        <p:nvCxnSpPr>
+          <p:cNvPr id="12" name="Straight Arrow Connector 11"/>
+          <p:cNvCxnSpPr/>
+          <p:nvPr/>
+        </p:nvCxnSpPr>
+        <p:spPr>
+          <a:xfrm>
+            <a:off x="4499992" y="4221088"/>
+            <a:ext cx="0" cy="792088"/>
+          </a:xfrm>
+          <a:prstGeom prst="straightConnector1">
+            <a:avLst/>
+          </a:prstGeom>
+          <a:ln w="15875">
+            <a:tailEnd type="arrow"/>
+          </a:ln>
+        </p:spPr>
+        <p:style>
+          <a:lnRef idx="1">
+            <a:schemeClr val="accent1"/>
+          </a:lnRef>
+          <a:fillRef idx="0">
+            <a:schemeClr val="accent1"/>
+          </a:fillRef>
+          <a:effectRef idx="0">
+            <a:schemeClr val="accent1"/>
+          </a:effectRef>
+          <a:fontRef idx="minor">
+            <a:schemeClr val="tx1"/>
+          </a:fontRef>
+        </p:style>
+      </p:cxnSp>
+    </p:spTree>
+  </p:cSld>
+  <p:clrMapOvr>
+    <a:masterClrMapping/>
+  </p:clrMapOvr>
+  <p:timing>
+    <p:tnLst>
+      <p:par>
+        <p:cTn id="1" dur="indefinite" restart="never" nodeType="tmRoot"/>
+      </p:par>
+    </p:tnLst>
+  </p:timing>
+</p:sld>
+</file>
+
+<file path=ppt/slides/slide9.xml><?xml version="1.0" encoding="utf-8"?>
+<p:sld xmlns:a="http://schemas.openxmlformats.org/drawingml/2006/main" xmlns:r="http://schemas.openxmlformats.org/officeDocument/2006/relationships" xmlns:p="http://schemas.openxmlformats.org/presentationml/2006/main">
+  <p:cSld>
+    <p:spTree>
+      <p:nvGrpSpPr>
+        <p:cNvPr id="1" name=""/>
+        <p:cNvGrpSpPr/>
+        <p:nvPr/>
+      </p:nvGrpSpPr>
+      <p:grpSpPr>
+        <a:xfrm>
+          <a:off x="0" y="0"/>
+          <a:ext cx="0" cy="0"/>
+          <a:chOff x="0" y="0"/>
+          <a:chExt cx="0" cy="0"/>
+        </a:xfrm>
+      </p:grpSpPr>
+      <p:sp>
+        <p:nvSpPr>
+          <p:cNvPr id="2" name="Title 1"/>
+          <p:cNvSpPr>
+            <a:spLocks noGrp="1"/>
+          </p:cNvSpPr>
+          <p:nvPr>
+            <p:ph type="title"/>
+          </p:nvPr>
+        </p:nvSpPr>
+        <p:spPr/>
+        <p:txBody>
+          <a:bodyPr/>
+          <a:lstStyle/>
+          <a:p>
+            <a:r>
+              <a:rPr lang="pl-PL" dirty="0" smtClean="0"/>
+              <a:t>Independent domain layering</a:t>
+            </a:r>
+            <a:endParaRPr lang="en-US" dirty="0"/>
+          </a:p>
+        </p:txBody>
+      </p:sp>
+      <p:sp>
+        <p:nvSpPr>
+          <p:cNvPr id="4" name="Rectangle 3"/>
+          <p:cNvSpPr/>
+          <p:nvPr/>
+        </p:nvSpPr>
+        <p:spPr>
+          <a:xfrm>
+            <a:off x="1619672" y="1844824"/>
+            <a:ext cx="5832648" cy="792088"/>
+          </a:xfrm>
+          <a:prstGeom prst="rect">
+            <a:avLst/>
+          </a:prstGeom>
+          <a:solidFill>
+            <a:srgbClr val="0070C0"/>
+          </a:solidFill>
+          <a:ln>
+            <a:solidFill>
+              <a:srgbClr val="0070C0"/>
+            </a:solidFill>
+          </a:ln>
+        </p:spPr>
+        <p:style>
+          <a:lnRef idx="2">
+            <a:schemeClr val="accent1">
+              <a:shade val="50000"/>
+            </a:schemeClr>
+          </a:lnRef>
+          <a:fillRef idx="1">
+            <a:schemeClr val="accent1"/>
+          </a:fillRef>
+          <a:effectRef idx="0">
+            <a:schemeClr val="accent1"/>
+          </a:effectRef>
+          <a:fontRef idx="minor">
+            <a:schemeClr val="lt1"/>
+          </a:fontRef>
+        </p:style>
+        <p:txBody>
+          <a:bodyPr rtlCol="0" anchor="ctr"/>
+          <a:lstStyle/>
+          <a:p>
+            <a:pPr algn="ctr"/>
+            <a:r>
+              <a:rPr lang="pl-PL" dirty="0" smtClean="0"/>
+              <a:t>Presentation</a:t>
+            </a:r>
+            <a:endParaRPr lang="en-US" dirty="0"/>
+          </a:p>
+        </p:txBody>
+      </p:sp>
+      <p:sp>
+        <p:nvSpPr>
+          <p:cNvPr id="8" name="Rectangle 7"/>
+          <p:cNvSpPr/>
+          <p:nvPr/>
+        </p:nvSpPr>
+        <p:spPr>
+          <a:xfrm>
+            <a:off x="1619672" y="3429000"/>
+            <a:ext cx="5832648" cy="792088"/>
+          </a:xfrm>
+          <a:prstGeom prst="rect">
+            <a:avLst/>
+          </a:prstGeom>
+          <a:solidFill>
+            <a:schemeClr val="accent3">
+              <a:lumMod val="75000"/>
+            </a:schemeClr>
+          </a:solidFill>
+          <a:ln>
+            <a:solidFill>
+              <a:schemeClr val="accent3">
+                <a:lumMod val="75000"/>
+              </a:schemeClr>
+            </a:solidFill>
+          </a:ln>
+        </p:spPr>
+        <p:style>
+          <a:lnRef idx="2">
+            <a:schemeClr val="accent1">
+              <a:shade val="50000"/>
+            </a:schemeClr>
+          </a:lnRef>
+          <a:fillRef idx="1">
+            <a:schemeClr val="accent1"/>
+          </a:fillRef>
+          <a:effectRef idx="0">
+            <a:schemeClr val="accent1"/>
+          </a:effectRef>
+          <a:fontRef idx="minor">
+            <a:schemeClr val="lt1"/>
+          </a:fontRef>
+        </p:style>
+        <p:txBody>
+          <a:bodyPr rtlCol="0" anchor="ctr"/>
+          <a:lstStyle/>
+          <a:p>
+            <a:pPr algn="ctr"/>
+            <a:r>
+              <a:rPr lang="pl-PL" dirty="0" smtClean="0"/>
+              <a:t>Domain</a:t>
+            </a:r>
+            <a:endParaRPr lang="en-US" dirty="0"/>
+          </a:p>
+        </p:txBody>
+      </p:sp>
+      <p:sp>
+        <p:nvSpPr>
+          <p:cNvPr id="9" name="Rectangle 8"/>
+          <p:cNvSpPr/>
+          <p:nvPr/>
+        </p:nvSpPr>
+        <p:spPr>
+          <a:xfrm>
+            <a:off x="1619672" y="5013176"/>
+            <a:ext cx="5832648" cy="792088"/>
+          </a:xfrm>
+          <a:prstGeom prst="rect">
+            <a:avLst/>
+          </a:prstGeom>
+          <a:solidFill>
+            <a:srgbClr val="FFC000"/>
+          </a:solidFill>
+          <a:ln>
+            <a:solidFill>
+              <a:srgbClr val="FFC000"/>
+            </a:solidFill>
+          </a:ln>
+        </p:spPr>
+        <p:style>
+          <a:lnRef idx="2">
+            <a:schemeClr val="accent1">
+              <a:shade val="50000"/>
+            </a:schemeClr>
+          </a:lnRef>
+          <a:fillRef idx="1">
+            <a:schemeClr val="accent1"/>
+          </a:fillRef>
+          <a:effectRef idx="0">
+            <a:schemeClr val="accent1"/>
+          </a:effectRef>
+          <a:fontRef idx="minor">
+            <a:schemeClr val="lt1"/>
+          </a:fontRef>
+        </p:style>
+        <p:txBody>
+          <a:bodyPr rtlCol="0" anchor="ctr"/>
+          <a:lstStyle/>
+          <a:p>
+            <a:pPr algn="ctr"/>
+            <a:r>
+              <a:rPr lang="pl-PL" dirty="0" smtClean="0"/>
+              <a:t>Infrastructure</a:t>
+            </a:r>
+            <a:endParaRPr lang="en-US" dirty="0" smtClean="0"/>
+          </a:p>
+        </p:txBody>
+      </p:sp>
+      <p:cxnSp>
+        <p:nvCxnSpPr>
+          <p:cNvPr id="11" name="Straight Arrow Connector 10"/>
+          <p:cNvCxnSpPr>
+            <a:stCxn id="4" idx="2"/>
+            <a:endCxn id="8" idx="0"/>
+          </p:cNvCxnSpPr>
+          <p:nvPr/>
+        </p:nvCxnSpPr>
+        <p:spPr>
+          <a:xfrm>
+            <a:off x="4535996" y="2636912"/>
+            <a:ext cx="0" cy="792088"/>
+          </a:xfrm>
+          <a:prstGeom prst="straightConnector1">
+            <a:avLst/>
+          </a:prstGeom>
+          <a:ln w="15875">
+            <a:tailEnd type="arrow"/>
+          </a:ln>
+        </p:spPr>
+        <p:style>
+          <a:lnRef idx="1">
+            <a:schemeClr val="accent1"/>
+          </a:lnRef>
+          <a:fillRef idx="0">
+            <a:schemeClr val="accent1"/>
+          </a:fillRef>
+          <a:effectRef idx="0">
+            <a:schemeClr val="accent1"/>
+          </a:effectRef>
+          <a:fontRef idx="minor">
+            <a:schemeClr val="tx1"/>
+          </a:fontRef>
+        </p:style>
+      </p:cxnSp>
+      <p:cxnSp>
+        <p:nvCxnSpPr>
+          <p:cNvPr id="12" name="Straight Arrow Connector 11"/>
+          <p:cNvCxnSpPr>
+            <a:stCxn id="9" idx="0"/>
+            <a:endCxn id="8" idx="2"/>
+          </p:cNvCxnSpPr>
+          <p:nvPr/>
+        </p:nvCxnSpPr>
+        <p:spPr>
+          <a:xfrm flipV="1">
+            <a:off x="4535996" y="4221088"/>
+            <a:ext cx="0" cy="792088"/>
+          </a:xfrm>
+          <a:prstGeom prst="straightConnector1">
+            <a:avLst/>
+          </a:prstGeom>
+          <a:ln w="15875">
+            <a:tailEnd type="arrow"/>
+          </a:ln>
+        </p:spPr>
+        <p:style>
+          <a:lnRef idx="1">
+            <a:schemeClr val="accent1"/>
+          </a:lnRef>
+          <a:fillRef idx="0">
+            <a:schemeClr val="accent1"/>
+          </a:fillRef>
+          <a:effectRef idx="0">
+            <a:schemeClr val="accent1"/>
+          </a:effectRef>
+          <a:fontRef idx="minor">
+            <a:schemeClr val="tx1"/>
+          </a:fontRef>
+        </p:style>
+      </p:cxnSp>
+    </p:spTree>
+  </p:cSld>
+  <p:clrMapOvr>
+    <a:masterClrMapping/>
+  </p:clrMapOvr>
+  <p:transition/>
+  <p:timing>
+    <p:tnLst>
+      <p:par>
+        <p:cTn id="1" dur="indefinite" restart="never" nodeType="tmRoot">
+          <p:childTnLst>
+            <p:seq concurrent="1" nextAc="seek">
+              <p:cTn id="2" dur="indefinite" nodeType="mainSeq">
+                <p:childTnLst>
+                  <p:par>
+                    <p:cTn id="3" fill="hold">
+                      <p:stCondLst>
+                        <p:cond delay="indefinite"/>
+                      </p:stCondLst>
+                      <p:childTnLst>
+                        <p:par>
+                          <p:cTn id="4" fill="hold">
+                            <p:stCondLst>
+                              <p:cond delay="0"/>
+                            </p:stCondLst>
+                            <p:childTnLst>
+                              <p:par>
+                                <p:cTn id="5" presetID="22" presetClass="entr" presetSubtype="4" fill="hold" nodeType="clickEffect">
+                                  <p:stCondLst>
+                                    <p:cond delay="0"/>
+                                  </p:stCondLst>
+                                  <p:childTnLst>
+                                    <p:set>
+                                      <p:cBhvr>
+                                        <p:cTn id="6" dur="1" fill="hold">
+                                          <p:stCondLst>
+                                            <p:cond delay="0"/>
+                                          </p:stCondLst>
+                                        </p:cTn>
+                                        <p:tgtEl>
+                                          <p:spTgt spid="12"/>
+                                        </p:tgtEl>
+                                        <p:attrNameLst>
+                                          <p:attrName>style.visibility</p:attrName>
+                                        </p:attrNameLst>
+                                      </p:cBhvr>
+                                      <p:to>
+                                        <p:strVal val="visible"/>
+                                      </p:to>
+                                    </p:set>
+                                    <p:animEffect transition="in" filter="wipe(down)">
+                                      <p:cBhvr>
+                                        <p:cTn id="7" dur="500"/>
+                                        <p:tgtEl>
+                                          <p:spTgt spid="12"/>
+                                        </p:tgtEl>
+                                      </p:cBhvr>
+                                    </p:animEffect>
+                                  </p:childTnLst>
+                                </p:cTn>
+                              </p:par>
+                            </p:childTnLst>
+                          </p:cTn>
+                        </p:par>
+                      </p:childTnLst>
+                    </p:cTn>
+                  </p:par>
+                </p:childTnLst>
+              </p:cTn>
+              <p:prevCondLst>
+                <p:cond evt="onPrev" delay="0">
+                  <p:tgtEl>
+                    <p:sldTgt/>
+                  </p:tgtEl>
+                </p:cond>
+              </p:prevCondLst>
+              <p:nextCondLst>
+                <p:cond evt="onNext" delay="0">
+                  <p:tgtEl>
+                    <p:sldTgt/>
+                  </p:tgtEl>
+                </p:cond>
+              </p:nextCondLst>
+            </p:seq>
+          </p:childTnLst>
+        </p:cTn>
+      </p:par>
+    </p:tnLst>
+  </p:timing>
 </p:sld>
 </file>
 

</xml_diff>

<commit_message>
slide of layers and tiers
</commit_message>
<xml_diff>
--- a/IntroToArchitecture.pptx
+++ b/IntroToArchitecture.pptx
@@ -8,14 +8,15 @@
     <p:sldId id="256" r:id="rId2"/>
     <p:sldId id="265" r:id="rId3"/>
     <p:sldId id="266" r:id="rId4"/>
-    <p:sldId id="257" r:id="rId5"/>
-    <p:sldId id="258" r:id="rId6"/>
-    <p:sldId id="260" r:id="rId7"/>
-    <p:sldId id="259" r:id="rId8"/>
-    <p:sldId id="261" r:id="rId9"/>
-    <p:sldId id="262" r:id="rId10"/>
-    <p:sldId id="263" r:id="rId11"/>
-    <p:sldId id="264" r:id="rId12"/>
+    <p:sldId id="267" r:id="rId5"/>
+    <p:sldId id="257" r:id="rId6"/>
+    <p:sldId id="258" r:id="rId7"/>
+    <p:sldId id="260" r:id="rId8"/>
+    <p:sldId id="259" r:id="rId9"/>
+    <p:sldId id="261" r:id="rId10"/>
+    <p:sldId id="262" r:id="rId11"/>
+    <p:sldId id="263" r:id="rId12"/>
+    <p:sldId id="264" r:id="rId13"/>
   </p:sldIdLst>
   <p:sldSz cx="9144000" cy="6858000" type="screen4x3"/>
   <p:notesSz cx="6858000" cy="9144000"/>
@@ -299,7 +300,7 @@
             <a:fld id="{9E579FCD-C7FB-4CDF-8CA4-138E1F44076D}" type="datetimeFigureOut">
               <a:rPr lang="pl-PL" smtClean="0"/>
               <a:pPr/>
-              <a:t>2013-12-10</a:t>
+              <a:t>2013-12-11</a:t>
             </a:fld>
             <a:endParaRPr lang="pl-PL"/>
           </a:p>
@@ -466,7 +467,7 @@
             <a:fld id="{9E579FCD-C7FB-4CDF-8CA4-138E1F44076D}" type="datetimeFigureOut">
               <a:rPr lang="pl-PL" smtClean="0"/>
               <a:pPr/>
-              <a:t>2013-12-10</a:t>
+              <a:t>2013-12-11</a:t>
             </a:fld>
             <a:endParaRPr lang="pl-PL"/>
           </a:p>
@@ -643,7 +644,7 @@
             <a:fld id="{9E579FCD-C7FB-4CDF-8CA4-138E1F44076D}" type="datetimeFigureOut">
               <a:rPr lang="pl-PL" smtClean="0"/>
               <a:pPr/>
-              <a:t>2013-12-10</a:t>
+              <a:t>2013-12-11</a:t>
             </a:fld>
             <a:endParaRPr lang="pl-PL"/>
           </a:p>
@@ -810,7 +811,7 @@
             <a:fld id="{9E579FCD-C7FB-4CDF-8CA4-138E1F44076D}" type="datetimeFigureOut">
               <a:rPr lang="pl-PL" smtClean="0"/>
               <a:pPr/>
-              <a:t>2013-12-10</a:t>
+              <a:t>2013-12-11</a:t>
             </a:fld>
             <a:endParaRPr lang="pl-PL"/>
           </a:p>
@@ -1053,7 +1054,7 @@
             <a:fld id="{9E579FCD-C7FB-4CDF-8CA4-138E1F44076D}" type="datetimeFigureOut">
               <a:rPr lang="pl-PL" smtClean="0"/>
               <a:pPr/>
-              <a:t>2013-12-10</a:t>
+              <a:t>2013-12-11</a:t>
             </a:fld>
             <a:endParaRPr lang="pl-PL"/>
           </a:p>
@@ -1338,7 +1339,7 @@
             <a:fld id="{9E579FCD-C7FB-4CDF-8CA4-138E1F44076D}" type="datetimeFigureOut">
               <a:rPr lang="pl-PL" smtClean="0"/>
               <a:pPr/>
-              <a:t>2013-12-10</a:t>
+              <a:t>2013-12-11</a:t>
             </a:fld>
             <a:endParaRPr lang="pl-PL"/>
           </a:p>
@@ -1757,7 +1758,7 @@
             <a:fld id="{9E579FCD-C7FB-4CDF-8CA4-138E1F44076D}" type="datetimeFigureOut">
               <a:rPr lang="pl-PL" smtClean="0"/>
               <a:pPr/>
-              <a:t>2013-12-10</a:t>
+              <a:t>2013-12-11</a:t>
             </a:fld>
             <a:endParaRPr lang="pl-PL"/>
           </a:p>
@@ -1872,7 +1873,7 @@
             <a:fld id="{9E579FCD-C7FB-4CDF-8CA4-138E1F44076D}" type="datetimeFigureOut">
               <a:rPr lang="pl-PL" smtClean="0"/>
               <a:pPr/>
-              <a:t>2013-12-10</a:t>
+              <a:t>2013-12-11</a:t>
             </a:fld>
             <a:endParaRPr lang="pl-PL"/>
           </a:p>
@@ -1964,7 +1965,7 @@
             <a:fld id="{9E579FCD-C7FB-4CDF-8CA4-138E1F44076D}" type="datetimeFigureOut">
               <a:rPr lang="pl-PL" smtClean="0"/>
               <a:pPr/>
-              <a:t>2013-12-10</a:t>
+              <a:t>2013-12-11</a:t>
             </a:fld>
             <a:endParaRPr lang="pl-PL"/>
           </a:p>
@@ -2238,7 +2239,7 @@
             <a:fld id="{9E579FCD-C7FB-4CDF-8CA4-138E1F44076D}" type="datetimeFigureOut">
               <a:rPr lang="pl-PL" smtClean="0"/>
               <a:pPr/>
-              <a:t>2013-12-10</a:t>
+              <a:t>2013-12-11</a:t>
             </a:fld>
             <a:endParaRPr lang="pl-PL"/>
           </a:p>
@@ -2488,7 +2489,7 @@
             <a:fld id="{9E579FCD-C7FB-4CDF-8CA4-138E1F44076D}" type="datetimeFigureOut">
               <a:rPr lang="pl-PL" smtClean="0"/>
               <a:pPr/>
-              <a:t>2013-12-10</a:t>
+              <a:t>2013-12-11</a:t>
             </a:fld>
             <a:endParaRPr lang="pl-PL"/>
           </a:p>
@@ -2698,7 +2699,7 @@
             <a:fld id="{9E579FCD-C7FB-4CDF-8CA4-138E1F44076D}" type="datetimeFigureOut">
               <a:rPr lang="pl-PL" smtClean="0"/>
               <a:pPr/>
-              <a:t>2013-12-10</a:t>
+              <a:t>2013-12-11</a:t>
             </a:fld>
             <a:endParaRPr lang="pl-PL"/>
           </a:p>
@@ -3153,1140 +3154,6 @@
           <a:p>
             <a:r>
               <a:rPr lang="pl-PL" dirty="0" smtClean="0"/>
-              <a:t>Layers implementation</a:t>
-            </a:r>
-            <a:endParaRPr lang="en-US" dirty="0"/>
-          </a:p>
-        </p:txBody>
-      </p:sp>
-      <p:sp>
-        <p:nvSpPr>
-          <p:cNvPr id="3" name="Content Placeholder 2"/>
-          <p:cNvSpPr>
-            <a:spLocks noGrp="1"/>
-          </p:cNvSpPr>
-          <p:nvPr>
-            <p:ph idx="1"/>
-          </p:nvPr>
-        </p:nvSpPr>
-        <p:spPr/>
-        <p:txBody>
-          <a:bodyPr/>
-          <a:lstStyle/>
-          <a:p>
-            <a:r>
-              <a:rPr lang="pl-PL" dirty="0" smtClean="0"/>
-              <a:t>Layers are:</a:t>
-            </a:r>
-          </a:p>
-          <a:p>
-            <a:pPr lvl="1"/>
-            <a:r>
-              <a:rPr lang="pl-PL" sz="2400" dirty="0" smtClean="0"/>
-              <a:t>Scripts / functions </a:t>
-            </a:r>
-          </a:p>
-          <a:p>
-            <a:pPr lvl="1"/>
-            <a:r>
-              <a:rPr lang="pl-PL" sz="2400" dirty="0" smtClean="0"/>
-              <a:t>Classes</a:t>
-            </a:r>
-          </a:p>
-          <a:p>
-            <a:pPr lvl="1"/>
-            <a:r>
-              <a:rPr lang="pl-PL" sz="2400" dirty="0" smtClean="0"/>
-              <a:t>Packages</a:t>
-            </a:r>
-          </a:p>
-          <a:p>
-            <a:r>
-              <a:rPr lang="pl-PL" dirty="0" smtClean="0"/>
-              <a:t>Layer </a:t>
-            </a:r>
-            <a:r>
-              <a:rPr lang="pl-PL" dirty="0" smtClean="0"/>
-              <a:t>affiliation, replacement test</a:t>
-            </a:r>
-          </a:p>
-          <a:p>
-            <a:endParaRPr lang="en-US" dirty="0"/>
-          </a:p>
-        </p:txBody>
-      </p:sp>
-    </p:spTree>
-  </p:cSld>
-  <p:clrMapOvr>
-    <a:masterClrMapping/>
-  </p:clrMapOvr>
-</p:sld>
-</file>
-
-<file path=ppt/slides/slide11.xml><?xml version="1.0" encoding="utf-8"?>
-<p:sld xmlns:a="http://schemas.openxmlformats.org/drawingml/2006/main" xmlns:r="http://schemas.openxmlformats.org/officeDocument/2006/relationships" xmlns:p="http://schemas.openxmlformats.org/presentationml/2006/main">
-  <p:cSld>
-    <p:spTree>
-      <p:nvGrpSpPr>
-        <p:cNvPr id="1" name=""/>
-        <p:cNvGrpSpPr/>
-        <p:nvPr/>
-      </p:nvGrpSpPr>
-      <p:grpSpPr>
-        <a:xfrm>
-          <a:off x="0" y="0"/>
-          <a:ext cx="0" cy="0"/>
-          <a:chOff x="0" y="0"/>
-          <a:chExt cx="0" cy="0"/>
-        </a:xfrm>
-      </p:grpSpPr>
-      <p:sp>
-        <p:nvSpPr>
-          <p:cNvPr id="2" name="Title 1"/>
-          <p:cNvSpPr>
-            <a:spLocks noGrp="1"/>
-          </p:cNvSpPr>
-          <p:nvPr>
-            <p:ph type="title"/>
-          </p:nvPr>
-        </p:nvSpPr>
-        <p:spPr/>
-        <p:txBody>
-          <a:bodyPr/>
-          <a:lstStyle/>
-          <a:p>
-            <a:r>
-              <a:rPr lang="pl-PL" dirty="0" smtClean="0"/>
-              <a:t>Layers distribution</a:t>
-            </a:r>
-            <a:endParaRPr lang="en-US" dirty="0"/>
-          </a:p>
-        </p:txBody>
-      </p:sp>
-      <p:sp>
-        <p:nvSpPr>
-          <p:cNvPr id="3" name="Content Placeholder 2"/>
-          <p:cNvSpPr>
-            <a:spLocks noGrp="1"/>
-          </p:cNvSpPr>
-          <p:nvPr>
-            <p:ph idx="1"/>
-          </p:nvPr>
-        </p:nvSpPr>
-        <p:spPr/>
-        <p:txBody>
-          <a:bodyPr/>
-          <a:lstStyle/>
-          <a:p>
-            <a:r>
-              <a:rPr lang="pl-PL" dirty="0" smtClean="0"/>
-              <a:t>Layers enable physical distribution</a:t>
-            </a:r>
-          </a:p>
-          <a:p>
-            <a:r>
-              <a:rPr lang="pl-PL" dirty="0" smtClean="0"/>
-              <a:t>Clear mapping between functionality and corresponding code </a:t>
-            </a:r>
-          </a:p>
-          <a:p>
-            <a:r>
-              <a:rPr lang="pl-PL" dirty="0" smtClean="0"/>
-              <a:t>Emphasis on </a:t>
-            </a:r>
-            <a:r>
-              <a:rPr lang="pl-PL" dirty="0" smtClean="0"/>
-              <a:t>coarse </a:t>
-            </a:r>
-            <a:r>
-              <a:rPr lang="pl-PL" dirty="0" smtClean="0"/>
-              <a:t>grained, non-distributed domain layer</a:t>
-            </a:r>
-          </a:p>
-          <a:p>
-            <a:r>
-              <a:rPr lang="pl-PL" dirty="0" smtClean="0"/>
-              <a:t>Non-splitted layers between nodes – physical and logical, complexity boosters</a:t>
-            </a:r>
-            <a:endParaRPr lang="en-US" dirty="0"/>
-          </a:p>
-        </p:txBody>
-      </p:sp>
-    </p:spTree>
-  </p:cSld>
-  <p:clrMapOvr>
-    <a:masterClrMapping/>
-  </p:clrMapOvr>
-</p:sld>
-</file>
-
-<file path=ppt/slides/slide2.xml><?xml version="1.0" encoding="utf-8"?>
-<p:sld xmlns:a="http://schemas.openxmlformats.org/drawingml/2006/main" xmlns:r="http://schemas.openxmlformats.org/officeDocument/2006/relationships" xmlns:p="http://schemas.openxmlformats.org/presentationml/2006/main">
-  <p:cSld>
-    <p:spTree>
-      <p:nvGrpSpPr>
-        <p:cNvPr id="1" name=""/>
-        <p:cNvGrpSpPr/>
-        <p:nvPr/>
-      </p:nvGrpSpPr>
-      <p:grpSpPr>
-        <a:xfrm>
-          <a:off x="0" y="0"/>
-          <a:ext cx="0" cy="0"/>
-          <a:chOff x="0" y="0"/>
-          <a:chExt cx="0" cy="0"/>
-        </a:xfrm>
-      </p:grpSpPr>
-      <p:sp>
-        <p:nvSpPr>
-          <p:cNvPr id="2" name="Title 1"/>
-          <p:cNvSpPr>
-            <a:spLocks noGrp="1"/>
-          </p:cNvSpPr>
-          <p:nvPr>
-            <p:ph type="title"/>
-          </p:nvPr>
-        </p:nvSpPr>
-        <p:spPr/>
-        <p:txBody>
-          <a:bodyPr/>
-          <a:lstStyle/>
-          <a:p>
-            <a:r>
-              <a:rPr lang="pl-PL" dirty="0" smtClean="0"/>
-              <a:t>Architecture</a:t>
-            </a:r>
-            <a:endParaRPr lang="en-US" dirty="0"/>
-          </a:p>
-        </p:txBody>
-      </p:sp>
-      <p:sp>
-        <p:nvSpPr>
-          <p:cNvPr id="3" name="Content Placeholder 2"/>
-          <p:cNvSpPr>
-            <a:spLocks noGrp="1"/>
-          </p:cNvSpPr>
-          <p:nvPr>
-            <p:ph idx="1"/>
-          </p:nvPr>
-        </p:nvSpPr>
-        <p:spPr/>
-        <p:txBody>
-          <a:bodyPr/>
-          <a:lstStyle/>
-          <a:p>
-            <a:r>
-              <a:rPr lang="pl-PL" dirty="0" smtClean="0"/>
-              <a:t>Subjective system’s vision, common definition of components and their interconnections, also:</a:t>
-            </a:r>
-          </a:p>
-          <a:p>
-            <a:r>
-              <a:rPr lang="pl-PL" dirty="0" smtClean="0"/>
-              <a:t>Practices that define software design and decomposition into structures</a:t>
-            </a:r>
-          </a:p>
-        </p:txBody>
-      </p:sp>
-    </p:spTree>
-  </p:cSld>
-  <p:clrMapOvr>
-    <a:masterClrMapping/>
-  </p:clrMapOvr>
-</p:sld>
-</file>
-
-<file path=ppt/slides/slide3.xml><?xml version="1.0" encoding="utf-8"?>
-<p:sld xmlns:a="http://schemas.openxmlformats.org/drawingml/2006/main" xmlns:r="http://schemas.openxmlformats.org/officeDocument/2006/relationships" xmlns:p="http://schemas.openxmlformats.org/presentationml/2006/main">
-  <p:cSld>
-    <p:spTree>
-      <p:nvGrpSpPr>
-        <p:cNvPr id="1" name=""/>
-        <p:cNvGrpSpPr/>
-        <p:nvPr/>
-      </p:nvGrpSpPr>
-      <p:grpSpPr>
-        <a:xfrm>
-          <a:off x="0" y="0"/>
-          <a:ext cx="0" cy="0"/>
-          <a:chOff x="0" y="0"/>
-          <a:chExt cx="0" cy="0"/>
-        </a:xfrm>
-      </p:grpSpPr>
-      <p:sp>
-        <p:nvSpPr>
-          <p:cNvPr id="2" name="Title 1"/>
-          <p:cNvSpPr>
-            <a:spLocks noGrp="1"/>
-          </p:cNvSpPr>
-          <p:nvPr>
-            <p:ph type="title"/>
-          </p:nvPr>
-        </p:nvSpPr>
-        <p:spPr/>
-        <p:txBody>
-          <a:bodyPr/>
-          <a:lstStyle/>
-          <a:p>
-            <a:r>
-              <a:rPr lang="pl-PL" dirty="0" smtClean="0"/>
-              <a:t>Architecture Patterns</a:t>
-            </a:r>
-            <a:endParaRPr lang="en-US" dirty="0"/>
-          </a:p>
-        </p:txBody>
-      </p:sp>
-      <p:sp>
-        <p:nvSpPr>
-          <p:cNvPr id="3" name="Content Placeholder 2"/>
-          <p:cNvSpPr>
-            <a:spLocks noGrp="1"/>
-          </p:cNvSpPr>
-          <p:nvPr>
-            <p:ph idx="1"/>
-          </p:nvPr>
-        </p:nvSpPr>
-        <p:spPr/>
-        <p:txBody>
-          <a:bodyPr/>
-          <a:lstStyle/>
-          <a:p>
-            <a:r>
-              <a:rPr lang="pl-PL" dirty="0" smtClean="0"/>
-              <a:t>Architecture patterns are general, reusable solution to commonly occuring </a:t>
-            </a:r>
-            <a:r>
-              <a:rPr lang="pl-PL" dirty="0" smtClean="0"/>
-              <a:t>problem</a:t>
-            </a:r>
-          </a:p>
-          <a:p>
-            <a:r>
-              <a:rPr lang="pl-PL" dirty="0" smtClean="0"/>
-              <a:t>Help make decisions about architecture</a:t>
-            </a:r>
-          </a:p>
-          <a:p>
-            <a:r>
-              <a:rPr lang="pl-PL" dirty="0" smtClean="0"/>
-              <a:t>Not out-of the box solutions, frequently adjusted to context</a:t>
-            </a:r>
-          </a:p>
-          <a:p>
-            <a:r>
-              <a:rPr lang="pl-PL" dirty="0" smtClean="0"/>
-              <a:t>Dictionary of typical problem-solution or software structures</a:t>
-            </a:r>
-            <a:endParaRPr lang="en-US" dirty="0" smtClean="0"/>
-          </a:p>
-          <a:p>
-            <a:endParaRPr lang="en-US" dirty="0"/>
-          </a:p>
-        </p:txBody>
-      </p:sp>
-    </p:spTree>
-  </p:cSld>
-  <p:clrMapOvr>
-    <a:masterClrMapping/>
-  </p:clrMapOvr>
-</p:sld>
-</file>
-
-<file path=ppt/slides/slide4.xml><?xml version="1.0" encoding="utf-8"?>
-<p:sld xmlns:a="http://schemas.openxmlformats.org/drawingml/2006/main" xmlns:r="http://schemas.openxmlformats.org/officeDocument/2006/relationships" xmlns:p="http://schemas.openxmlformats.org/presentationml/2006/main">
-  <p:cSld>
-    <p:spTree>
-      <p:nvGrpSpPr>
-        <p:cNvPr id="1" name=""/>
-        <p:cNvGrpSpPr/>
-        <p:nvPr/>
-      </p:nvGrpSpPr>
-      <p:grpSpPr>
-        <a:xfrm>
-          <a:off x="0" y="0"/>
-          <a:ext cx="0" cy="0"/>
-          <a:chOff x="0" y="0"/>
-          <a:chExt cx="0" cy="0"/>
-        </a:xfrm>
-      </p:grpSpPr>
-      <p:pic>
-        <p:nvPicPr>
-          <p:cNvPr id="1026" name="Picture 2" descr="http://farm6.staticflickr.com/5259/5506258524_bafd18d805.jpg"/>
-          <p:cNvPicPr>
-            <a:picLocks noChangeAspect="1" noChangeArrowheads="1"/>
-          </p:cNvPicPr>
-          <p:nvPr/>
-        </p:nvPicPr>
-        <p:blipFill>
-          <a:blip r:embed="rId2" cstate="print"/>
-          <a:srcRect/>
-          <a:stretch>
-            <a:fillRect/>
-          </a:stretch>
-        </p:blipFill>
-        <p:spPr bwMode="auto">
-          <a:xfrm>
-            <a:off x="2627784" y="1436778"/>
-            <a:ext cx="3499867" cy="4666489"/>
-          </a:xfrm>
-          <a:prstGeom prst="rect">
-            <a:avLst/>
-          </a:prstGeom>
-          <a:noFill/>
-        </p:spPr>
-      </p:pic>
-      <p:sp>
-        <p:nvSpPr>
-          <p:cNvPr id="5" name="Tytuł 1"/>
-          <p:cNvSpPr>
-            <a:spLocks noGrp="1"/>
-          </p:cNvSpPr>
-          <p:nvPr>
-            <p:ph type="title"/>
-          </p:nvPr>
-        </p:nvSpPr>
-        <p:spPr>
-          <a:xfrm>
-            <a:off x="457200" y="274638"/>
-            <a:ext cx="8229600" cy="1143000"/>
-          </a:xfrm>
-        </p:spPr>
-        <p:txBody>
-          <a:bodyPr/>
-          <a:lstStyle/>
-          <a:p>
-            <a:r>
-              <a:rPr lang="pl-PL" dirty="0" err="1" smtClean="0"/>
-              <a:t>Three</a:t>
-            </a:r>
-            <a:r>
-              <a:rPr lang="pl-PL" dirty="0" smtClean="0"/>
-              <a:t> </a:t>
-            </a:r>
-            <a:r>
-              <a:rPr lang="pl-PL" dirty="0" err="1" smtClean="0"/>
-              <a:t>tier</a:t>
-            </a:r>
-            <a:r>
-              <a:rPr lang="pl-PL" dirty="0" smtClean="0"/>
-              <a:t> </a:t>
-            </a:r>
-            <a:r>
-              <a:rPr lang="pl-PL" dirty="0" err="1" smtClean="0"/>
-              <a:t>architecture</a:t>
-            </a:r>
-            <a:endParaRPr lang="pl-PL" dirty="0"/>
-          </a:p>
-        </p:txBody>
-      </p:sp>
-    </p:spTree>
-  </p:cSld>
-  <p:clrMapOvr>
-    <a:masterClrMapping/>
-  </p:clrMapOvr>
-</p:sld>
-</file>
-
-<file path=ppt/slides/slide5.xml><?xml version="1.0" encoding="utf-8"?>
-<p:sld xmlns:a="http://schemas.openxmlformats.org/drawingml/2006/main" xmlns:r="http://schemas.openxmlformats.org/officeDocument/2006/relationships" xmlns:p="http://schemas.openxmlformats.org/presentationml/2006/main">
-  <p:cSld>
-    <p:spTree>
-      <p:nvGrpSpPr>
-        <p:cNvPr id="1" name=""/>
-        <p:cNvGrpSpPr/>
-        <p:nvPr/>
-      </p:nvGrpSpPr>
-      <p:grpSpPr>
-        <a:xfrm>
-          <a:off x="0" y="0"/>
-          <a:ext cx="0" cy="0"/>
-          <a:chOff x="0" y="0"/>
-          <a:chExt cx="0" cy="0"/>
-        </a:xfrm>
-      </p:grpSpPr>
-      <p:sp>
-        <p:nvSpPr>
-          <p:cNvPr id="2" name="Tytuł 1"/>
-          <p:cNvSpPr>
-            <a:spLocks noGrp="1"/>
-          </p:cNvSpPr>
-          <p:nvPr>
-            <p:ph type="title"/>
-          </p:nvPr>
-        </p:nvSpPr>
-        <p:spPr/>
-        <p:txBody>
-          <a:bodyPr/>
-          <a:lstStyle/>
-          <a:p>
-            <a:r>
-              <a:rPr lang="pl-PL" dirty="0" err="1" smtClean="0"/>
-              <a:t>Three</a:t>
-            </a:r>
-            <a:r>
-              <a:rPr lang="pl-PL" dirty="0" smtClean="0"/>
-              <a:t> </a:t>
-            </a:r>
-            <a:r>
-              <a:rPr lang="pl-PL" dirty="0" err="1" smtClean="0"/>
-              <a:t>tier</a:t>
-            </a:r>
-            <a:r>
-              <a:rPr lang="pl-PL" dirty="0" smtClean="0"/>
-              <a:t> </a:t>
-            </a:r>
-            <a:r>
-              <a:rPr lang="pl-PL" dirty="0" err="1" smtClean="0"/>
-              <a:t>architecture</a:t>
-            </a:r>
-            <a:endParaRPr lang="pl-PL" dirty="0"/>
-          </a:p>
-        </p:txBody>
-      </p:sp>
-      <p:pic>
-        <p:nvPicPr>
-          <p:cNvPr id="15363" name="Picture 3"/>
-          <p:cNvPicPr>
-            <a:picLocks noChangeAspect="1" noChangeArrowheads="1"/>
-          </p:cNvPicPr>
-          <p:nvPr/>
-        </p:nvPicPr>
-        <p:blipFill>
-          <a:blip r:embed="rId2" cstate="print"/>
-          <a:srcRect/>
-          <a:stretch>
-            <a:fillRect/>
-          </a:stretch>
-        </p:blipFill>
-        <p:spPr bwMode="auto">
-          <a:xfrm>
-            <a:off x="1691680" y="1340768"/>
-            <a:ext cx="5610200" cy="5021129"/>
-          </a:xfrm>
-          <a:prstGeom prst="rect">
-            <a:avLst/>
-          </a:prstGeom>
-          <a:noFill/>
-          <a:ln w="9525">
-            <a:noFill/>
-            <a:miter lim="800000"/>
-            <a:headEnd/>
-            <a:tailEnd/>
-          </a:ln>
-        </p:spPr>
-      </p:pic>
-      <p:sp>
-        <p:nvSpPr>
-          <p:cNvPr id="4" name="TextBox 3"/>
-          <p:cNvSpPr txBox="1"/>
-          <p:nvPr/>
-        </p:nvSpPr>
-        <p:spPr>
-          <a:xfrm>
-            <a:off x="467544" y="6453336"/>
-            <a:ext cx="4968552" cy="276999"/>
-          </a:xfrm>
-          <a:prstGeom prst="rect">
-            <a:avLst/>
-          </a:prstGeom>
-          <a:noFill/>
-        </p:spPr>
-        <p:txBody>
-          <a:bodyPr wrap="square" rtlCol="0">
-            <a:spAutoFit/>
-          </a:bodyPr>
-          <a:lstStyle/>
-          <a:p>
-            <a:r>
-              <a:rPr lang="en-US" sz="1200" dirty="0" smtClean="0"/>
-              <a:t>http://en.wikipedia.org/wiki/Multitier_architecture</a:t>
-            </a:r>
-            <a:endParaRPr lang="en-US" sz="1200" dirty="0"/>
-          </a:p>
-        </p:txBody>
-      </p:sp>
-    </p:spTree>
-  </p:cSld>
-  <p:clrMapOvr>
-    <a:masterClrMapping/>
-  </p:clrMapOvr>
-</p:sld>
-</file>
-
-<file path=ppt/slides/slide6.xml><?xml version="1.0" encoding="utf-8"?>
-<p:sld xmlns:a="http://schemas.openxmlformats.org/drawingml/2006/main" xmlns:r="http://schemas.openxmlformats.org/officeDocument/2006/relationships" xmlns:p="http://schemas.openxmlformats.org/presentationml/2006/main">
-  <p:cSld>
-    <p:spTree>
-      <p:nvGrpSpPr>
-        <p:cNvPr id="1" name=""/>
-        <p:cNvGrpSpPr/>
-        <p:nvPr/>
-      </p:nvGrpSpPr>
-      <p:grpSpPr>
-        <a:xfrm>
-          <a:off x="0" y="0"/>
-          <a:ext cx="0" cy="0"/>
-          <a:chOff x="0" y="0"/>
-          <a:chExt cx="0" cy="0"/>
-        </a:xfrm>
-      </p:grpSpPr>
-      <p:sp>
-        <p:nvSpPr>
-          <p:cNvPr id="2" name="Title 1"/>
-          <p:cNvSpPr>
-            <a:spLocks noGrp="1"/>
-          </p:cNvSpPr>
-          <p:nvPr>
-            <p:ph type="title"/>
-          </p:nvPr>
-        </p:nvSpPr>
-        <p:spPr/>
-        <p:txBody>
-          <a:bodyPr/>
-          <a:lstStyle/>
-          <a:p>
-            <a:r>
-              <a:rPr lang="pl-PL" dirty="0" smtClean="0"/>
-              <a:t>Hexagonal architecture</a:t>
-            </a:r>
-            <a:endParaRPr lang="en-US" dirty="0"/>
-          </a:p>
-        </p:txBody>
-      </p:sp>
-      <p:sp>
-        <p:nvSpPr>
-          <p:cNvPr id="3" name="Content Placeholder 2"/>
-          <p:cNvSpPr>
-            <a:spLocks noGrp="1"/>
-          </p:cNvSpPr>
-          <p:nvPr>
-            <p:ph idx="1"/>
-          </p:nvPr>
-        </p:nvSpPr>
-        <p:spPr>
-          <a:xfrm>
-            <a:off x="457200" y="1600200"/>
-            <a:ext cx="4690864" cy="4421088"/>
-          </a:xfrm>
-        </p:spPr>
-        <p:txBody>
-          <a:bodyPr/>
-          <a:lstStyle/>
-          <a:p>
-            <a:r>
-              <a:rPr lang="en-US" dirty="0" smtClean="0"/>
-              <a:t>avoid layer-to-layer dependencies usually associated with the N-tier architecture </a:t>
-            </a:r>
-            <a:r>
-              <a:rPr lang="en-US" dirty="0" smtClean="0"/>
-              <a:t>approach</a:t>
-            </a:r>
-            <a:r>
-              <a:rPr lang="pl-PL" dirty="0" smtClean="0"/>
-              <a:t> </a:t>
-            </a:r>
-            <a:r>
-              <a:rPr lang="en-US" dirty="0" smtClean="0"/>
-              <a:t>by </a:t>
-            </a:r>
-            <a:r>
-              <a:rPr lang="en-US" dirty="0" smtClean="0"/>
-              <a:t>placing all infrastructure, including databases, outside the problem </a:t>
-            </a:r>
-            <a:r>
-              <a:rPr lang="en-US" dirty="0" smtClean="0"/>
-              <a:t>domain</a:t>
-            </a:r>
-            <a:endParaRPr lang="en-US" dirty="0"/>
-          </a:p>
-        </p:txBody>
-      </p:sp>
-      <p:pic>
-        <p:nvPicPr>
-          <p:cNvPr id="4" name="Picture 2" descr="http://alistair.cockburn.us/get/2301"/>
-          <p:cNvPicPr>
-            <a:picLocks noChangeAspect="1" noChangeArrowheads="1"/>
-          </p:cNvPicPr>
-          <p:nvPr/>
-        </p:nvPicPr>
-        <p:blipFill>
-          <a:blip r:embed="rId2" cstate="print"/>
-          <a:srcRect/>
-          <a:stretch>
-            <a:fillRect/>
-          </a:stretch>
-        </p:blipFill>
-        <p:spPr bwMode="auto">
-          <a:xfrm>
-            <a:off x="5076056" y="2060848"/>
-            <a:ext cx="3409950" cy="2276475"/>
-          </a:xfrm>
-          <a:prstGeom prst="rect">
-            <a:avLst/>
-          </a:prstGeom>
-          <a:noFill/>
-        </p:spPr>
-      </p:pic>
-      <p:sp>
-        <p:nvSpPr>
-          <p:cNvPr id="6" name="TextBox 5"/>
-          <p:cNvSpPr txBox="1"/>
-          <p:nvPr/>
-        </p:nvSpPr>
-        <p:spPr>
-          <a:xfrm>
-            <a:off x="539552" y="5949280"/>
-            <a:ext cx="8208912" cy="276999"/>
-          </a:xfrm>
-          <a:prstGeom prst="rect">
-            <a:avLst/>
-          </a:prstGeom>
-          <a:noFill/>
-        </p:spPr>
-        <p:txBody>
-          <a:bodyPr wrap="square" rtlCol="0">
-            <a:spAutoFit/>
-          </a:bodyPr>
-          <a:lstStyle/>
-          <a:p>
-            <a:r>
-              <a:rPr lang="en-US" sz="1200" dirty="0" smtClean="0"/>
-              <a:t>http://alistair.cockburn.us/Hexagonal+architecture</a:t>
-            </a:r>
-            <a:endParaRPr lang="en-US" sz="1200" dirty="0"/>
-          </a:p>
-        </p:txBody>
-      </p:sp>
-    </p:spTree>
-  </p:cSld>
-  <p:clrMapOvr>
-    <a:masterClrMapping/>
-  </p:clrMapOvr>
-</p:sld>
-</file>
-
-<file path=ppt/slides/slide7.xml><?xml version="1.0" encoding="utf-8"?>
-<p:sld xmlns:a="http://schemas.openxmlformats.org/drawingml/2006/main" xmlns:r="http://schemas.openxmlformats.org/officeDocument/2006/relationships" xmlns:p="http://schemas.openxmlformats.org/presentationml/2006/main">
-  <p:cSld>
-    <p:spTree>
-      <p:nvGrpSpPr>
-        <p:cNvPr id="1" name=""/>
-        <p:cNvGrpSpPr/>
-        <p:nvPr/>
-      </p:nvGrpSpPr>
-      <p:grpSpPr>
-        <a:xfrm>
-          <a:off x="0" y="0"/>
-          <a:ext cx="0" cy="0"/>
-          <a:chOff x="0" y="0"/>
-          <a:chExt cx="0" cy="0"/>
-        </a:xfrm>
-      </p:grpSpPr>
-      <p:sp>
-        <p:nvSpPr>
-          <p:cNvPr id="2" name="Title 1"/>
-          <p:cNvSpPr>
-            <a:spLocks noGrp="1"/>
-          </p:cNvSpPr>
-          <p:nvPr>
-            <p:ph type="title"/>
-          </p:nvPr>
-        </p:nvSpPr>
-        <p:spPr/>
-        <p:txBody>
-          <a:bodyPr/>
-          <a:lstStyle/>
-          <a:p>
-            <a:r>
-              <a:rPr lang="pl-PL" dirty="0" smtClean="0"/>
-              <a:t>Hexagonal architecture</a:t>
-            </a:r>
-            <a:endParaRPr lang="en-US" dirty="0"/>
-          </a:p>
-        </p:txBody>
-      </p:sp>
-      <p:pic>
-        <p:nvPicPr>
-          <p:cNvPr id="1028" name="Picture 4" descr="http://alistair.cockburn.us/get/2302"/>
-          <p:cNvPicPr>
-            <a:picLocks noChangeAspect="1" noChangeArrowheads="1"/>
-          </p:cNvPicPr>
-          <p:nvPr/>
-        </p:nvPicPr>
-        <p:blipFill>
-          <a:blip r:embed="rId2" cstate="print"/>
-          <a:srcRect/>
-          <a:stretch>
-            <a:fillRect/>
-          </a:stretch>
-        </p:blipFill>
-        <p:spPr bwMode="auto">
-          <a:xfrm>
-            <a:off x="1979712" y="1628800"/>
-            <a:ext cx="4638675" cy="3476626"/>
-          </a:xfrm>
-          <a:prstGeom prst="rect">
-            <a:avLst/>
-          </a:prstGeom>
-          <a:noFill/>
-        </p:spPr>
-      </p:pic>
-      <p:sp>
-        <p:nvSpPr>
-          <p:cNvPr id="6" name="TextBox 5"/>
-          <p:cNvSpPr txBox="1"/>
-          <p:nvPr/>
-        </p:nvSpPr>
-        <p:spPr>
-          <a:xfrm>
-            <a:off x="539552" y="5949280"/>
-            <a:ext cx="8208912" cy="276999"/>
-          </a:xfrm>
-          <a:prstGeom prst="rect">
-            <a:avLst/>
-          </a:prstGeom>
-          <a:noFill/>
-        </p:spPr>
-        <p:txBody>
-          <a:bodyPr wrap="square" rtlCol="0">
-            <a:spAutoFit/>
-          </a:bodyPr>
-          <a:lstStyle/>
-          <a:p>
-            <a:r>
-              <a:rPr lang="en-US" sz="1200" dirty="0" smtClean="0"/>
-              <a:t>http://alistair.cockburn.us/Hexagonal+architecture</a:t>
-            </a:r>
-            <a:endParaRPr lang="en-US" sz="1200" dirty="0"/>
-          </a:p>
-        </p:txBody>
-      </p:sp>
-    </p:spTree>
-  </p:cSld>
-  <p:clrMapOvr>
-    <a:masterClrMapping/>
-  </p:clrMapOvr>
-</p:sld>
-</file>
-
-<file path=ppt/slides/slide8.xml><?xml version="1.0" encoding="utf-8"?>
-<p:sld xmlns:a="http://schemas.openxmlformats.org/drawingml/2006/main" xmlns:r="http://schemas.openxmlformats.org/officeDocument/2006/relationships" xmlns:p="http://schemas.openxmlformats.org/presentationml/2006/main">
-  <p:cSld>
-    <p:spTree>
-      <p:nvGrpSpPr>
-        <p:cNvPr id="1" name=""/>
-        <p:cNvGrpSpPr/>
-        <p:nvPr/>
-      </p:nvGrpSpPr>
-      <p:grpSpPr>
-        <a:xfrm>
-          <a:off x="0" y="0"/>
-          <a:ext cx="0" cy="0"/>
-          <a:chOff x="0" y="0"/>
-          <a:chExt cx="0" cy="0"/>
-        </a:xfrm>
-      </p:grpSpPr>
-      <p:sp>
-        <p:nvSpPr>
-          <p:cNvPr id="2" name="Title 1"/>
-          <p:cNvSpPr>
-            <a:spLocks noGrp="1"/>
-          </p:cNvSpPr>
-          <p:nvPr>
-            <p:ph type="title"/>
-          </p:nvPr>
-        </p:nvSpPr>
-        <p:spPr/>
-        <p:txBody>
-          <a:bodyPr/>
-          <a:lstStyle/>
-          <a:p>
-            <a:r>
-              <a:rPr lang="pl-PL" dirty="0" smtClean="0"/>
-              <a:t>Independent domain layering</a:t>
-            </a:r>
-            <a:endParaRPr lang="en-US" dirty="0"/>
-          </a:p>
-        </p:txBody>
-      </p:sp>
-      <p:sp>
-        <p:nvSpPr>
-          <p:cNvPr id="4" name="Rectangle 3"/>
-          <p:cNvSpPr/>
-          <p:nvPr/>
-        </p:nvSpPr>
-        <p:spPr>
-          <a:xfrm>
-            <a:off x="1619672" y="1844824"/>
-            <a:ext cx="5832648" cy="792088"/>
-          </a:xfrm>
-          <a:prstGeom prst="rect">
-            <a:avLst/>
-          </a:prstGeom>
-          <a:solidFill>
-            <a:srgbClr val="0070C0"/>
-          </a:solidFill>
-          <a:ln>
-            <a:solidFill>
-              <a:srgbClr val="0070C0"/>
-            </a:solidFill>
-          </a:ln>
-        </p:spPr>
-        <p:style>
-          <a:lnRef idx="2">
-            <a:schemeClr val="accent1">
-              <a:shade val="50000"/>
-            </a:schemeClr>
-          </a:lnRef>
-          <a:fillRef idx="1">
-            <a:schemeClr val="accent1"/>
-          </a:fillRef>
-          <a:effectRef idx="0">
-            <a:schemeClr val="accent1"/>
-          </a:effectRef>
-          <a:fontRef idx="minor">
-            <a:schemeClr val="lt1"/>
-          </a:fontRef>
-        </p:style>
-        <p:txBody>
-          <a:bodyPr rtlCol="0" anchor="ctr"/>
-          <a:lstStyle/>
-          <a:p>
-            <a:pPr algn="ctr"/>
-            <a:r>
-              <a:rPr lang="pl-PL" dirty="0" smtClean="0"/>
-              <a:t>Presentation</a:t>
-            </a:r>
-            <a:endParaRPr lang="en-US" dirty="0"/>
-          </a:p>
-        </p:txBody>
-      </p:sp>
-      <p:sp>
-        <p:nvSpPr>
-          <p:cNvPr id="8" name="Rectangle 7"/>
-          <p:cNvSpPr/>
-          <p:nvPr/>
-        </p:nvSpPr>
-        <p:spPr>
-          <a:xfrm>
-            <a:off x="1619672" y="3429000"/>
-            <a:ext cx="5832648" cy="792088"/>
-          </a:xfrm>
-          <a:prstGeom prst="rect">
-            <a:avLst/>
-          </a:prstGeom>
-          <a:solidFill>
-            <a:schemeClr val="accent3">
-              <a:lumMod val="75000"/>
-            </a:schemeClr>
-          </a:solidFill>
-          <a:ln>
-            <a:solidFill>
-              <a:schemeClr val="accent3">
-                <a:lumMod val="75000"/>
-              </a:schemeClr>
-            </a:solidFill>
-          </a:ln>
-        </p:spPr>
-        <p:style>
-          <a:lnRef idx="2">
-            <a:schemeClr val="accent1">
-              <a:shade val="50000"/>
-            </a:schemeClr>
-          </a:lnRef>
-          <a:fillRef idx="1">
-            <a:schemeClr val="accent1"/>
-          </a:fillRef>
-          <a:effectRef idx="0">
-            <a:schemeClr val="accent1"/>
-          </a:effectRef>
-          <a:fontRef idx="minor">
-            <a:schemeClr val="lt1"/>
-          </a:fontRef>
-        </p:style>
-        <p:txBody>
-          <a:bodyPr rtlCol="0" anchor="ctr"/>
-          <a:lstStyle/>
-          <a:p>
-            <a:pPr algn="ctr"/>
-            <a:r>
-              <a:rPr lang="pl-PL" dirty="0" smtClean="0"/>
-              <a:t>Domain</a:t>
-            </a:r>
-            <a:endParaRPr lang="en-US" dirty="0"/>
-          </a:p>
-        </p:txBody>
-      </p:sp>
-      <p:sp>
-        <p:nvSpPr>
-          <p:cNvPr id="9" name="Rectangle 8"/>
-          <p:cNvSpPr/>
-          <p:nvPr/>
-        </p:nvSpPr>
-        <p:spPr>
-          <a:xfrm>
-            <a:off x="1619672" y="5013176"/>
-            <a:ext cx="5832648" cy="792088"/>
-          </a:xfrm>
-          <a:prstGeom prst="rect">
-            <a:avLst/>
-          </a:prstGeom>
-          <a:solidFill>
-            <a:srgbClr val="FFC000"/>
-          </a:solidFill>
-          <a:ln>
-            <a:solidFill>
-              <a:srgbClr val="FFC000"/>
-            </a:solidFill>
-          </a:ln>
-        </p:spPr>
-        <p:style>
-          <a:lnRef idx="2">
-            <a:schemeClr val="accent1">
-              <a:shade val="50000"/>
-            </a:schemeClr>
-          </a:lnRef>
-          <a:fillRef idx="1">
-            <a:schemeClr val="accent1"/>
-          </a:fillRef>
-          <a:effectRef idx="0">
-            <a:schemeClr val="accent1"/>
-          </a:effectRef>
-          <a:fontRef idx="minor">
-            <a:schemeClr val="lt1"/>
-          </a:fontRef>
-        </p:style>
-        <p:txBody>
-          <a:bodyPr rtlCol="0" anchor="ctr"/>
-          <a:lstStyle/>
-          <a:p>
-            <a:pPr algn="ctr"/>
-            <a:r>
-              <a:rPr lang="pl-PL" dirty="0" smtClean="0"/>
-              <a:t>Infrastructure</a:t>
-            </a:r>
-            <a:endParaRPr lang="en-US" dirty="0"/>
-          </a:p>
-        </p:txBody>
-      </p:sp>
-      <p:cxnSp>
-        <p:nvCxnSpPr>
-          <p:cNvPr id="11" name="Straight Arrow Connector 10"/>
-          <p:cNvCxnSpPr>
-            <a:stCxn id="4" idx="2"/>
-            <a:endCxn id="8" idx="0"/>
-          </p:cNvCxnSpPr>
-          <p:nvPr/>
-        </p:nvCxnSpPr>
-        <p:spPr>
-          <a:xfrm>
-            <a:off x="4535996" y="2636912"/>
-            <a:ext cx="0" cy="792088"/>
-          </a:xfrm>
-          <a:prstGeom prst="straightConnector1">
-            <a:avLst/>
-          </a:prstGeom>
-          <a:ln w="15875">
-            <a:tailEnd type="arrow"/>
-          </a:ln>
-        </p:spPr>
-        <p:style>
-          <a:lnRef idx="1">
-            <a:schemeClr val="accent1"/>
-          </a:lnRef>
-          <a:fillRef idx="0">
-            <a:schemeClr val="accent1"/>
-          </a:fillRef>
-          <a:effectRef idx="0">
-            <a:schemeClr val="accent1"/>
-          </a:effectRef>
-          <a:fontRef idx="minor">
-            <a:schemeClr val="tx1"/>
-          </a:fontRef>
-        </p:style>
-      </p:cxnSp>
-      <p:cxnSp>
-        <p:nvCxnSpPr>
-          <p:cNvPr id="12" name="Straight Arrow Connector 11"/>
-          <p:cNvCxnSpPr/>
-          <p:nvPr/>
-        </p:nvCxnSpPr>
-        <p:spPr>
-          <a:xfrm>
-            <a:off x="4499992" y="4221088"/>
-            <a:ext cx="0" cy="792088"/>
-          </a:xfrm>
-          <a:prstGeom prst="straightConnector1">
-            <a:avLst/>
-          </a:prstGeom>
-          <a:ln w="15875">
-            <a:tailEnd type="arrow"/>
-          </a:ln>
-        </p:spPr>
-        <p:style>
-          <a:lnRef idx="1">
-            <a:schemeClr val="accent1"/>
-          </a:lnRef>
-          <a:fillRef idx="0">
-            <a:schemeClr val="accent1"/>
-          </a:fillRef>
-          <a:effectRef idx="0">
-            <a:schemeClr val="accent1"/>
-          </a:effectRef>
-          <a:fontRef idx="minor">
-            <a:schemeClr val="tx1"/>
-          </a:fontRef>
-        </p:style>
-      </p:cxnSp>
-    </p:spTree>
-  </p:cSld>
-  <p:clrMapOvr>
-    <a:masterClrMapping/>
-  </p:clrMapOvr>
-  <p:timing>
-    <p:tnLst>
-      <p:par>
-        <p:cTn id="1" dur="indefinite" restart="never" nodeType="tmRoot"/>
-      </p:par>
-    </p:tnLst>
-  </p:timing>
-</p:sld>
-</file>
-
-<file path=ppt/slides/slide9.xml><?xml version="1.0" encoding="utf-8"?>
-<p:sld xmlns:a="http://schemas.openxmlformats.org/drawingml/2006/main" xmlns:r="http://schemas.openxmlformats.org/officeDocument/2006/relationships" xmlns:p="http://schemas.openxmlformats.org/presentationml/2006/main">
-  <p:cSld>
-    <p:spTree>
-      <p:nvGrpSpPr>
-        <p:cNvPr id="1" name=""/>
-        <p:cNvGrpSpPr/>
-        <p:nvPr/>
-      </p:nvGrpSpPr>
-      <p:grpSpPr>
-        <a:xfrm>
-          <a:off x="0" y="0"/>
-          <a:ext cx="0" cy="0"/>
-          <a:chOff x="0" y="0"/>
-          <a:chExt cx="0" cy="0"/>
-        </a:xfrm>
-      </p:grpSpPr>
-      <p:sp>
-        <p:nvSpPr>
-          <p:cNvPr id="2" name="Title 1"/>
-          <p:cNvSpPr>
-            <a:spLocks noGrp="1"/>
-          </p:cNvSpPr>
-          <p:nvPr>
-            <p:ph type="title"/>
-          </p:nvPr>
-        </p:nvSpPr>
-        <p:spPr/>
-        <p:txBody>
-          <a:bodyPr/>
-          <a:lstStyle/>
-          <a:p>
-            <a:r>
-              <a:rPr lang="pl-PL" dirty="0" smtClean="0"/>
               <a:t>Independent domain layering</a:t>
             </a:r>
             <a:endParaRPr lang="en-US" dirty="0"/>
@@ -4611,6 +3478,1350 @@
             </p:seq>
           </p:childTnLst>
         </p:cTn>
+      </p:par>
+    </p:tnLst>
+  </p:timing>
+</p:sld>
+</file>
+
+<file path=ppt/slides/slide11.xml><?xml version="1.0" encoding="utf-8"?>
+<p:sld xmlns:a="http://schemas.openxmlformats.org/drawingml/2006/main" xmlns:r="http://schemas.openxmlformats.org/officeDocument/2006/relationships" xmlns:p="http://schemas.openxmlformats.org/presentationml/2006/main">
+  <p:cSld>
+    <p:spTree>
+      <p:nvGrpSpPr>
+        <p:cNvPr id="1" name=""/>
+        <p:cNvGrpSpPr/>
+        <p:nvPr/>
+      </p:nvGrpSpPr>
+      <p:grpSpPr>
+        <a:xfrm>
+          <a:off x="0" y="0"/>
+          <a:ext cx="0" cy="0"/>
+          <a:chOff x="0" y="0"/>
+          <a:chExt cx="0" cy="0"/>
+        </a:xfrm>
+      </p:grpSpPr>
+      <p:sp>
+        <p:nvSpPr>
+          <p:cNvPr id="2" name="Title 1"/>
+          <p:cNvSpPr>
+            <a:spLocks noGrp="1"/>
+          </p:cNvSpPr>
+          <p:nvPr>
+            <p:ph type="title"/>
+          </p:nvPr>
+        </p:nvSpPr>
+        <p:spPr/>
+        <p:txBody>
+          <a:bodyPr/>
+          <a:lstStyle/>
+          <a:p>
+            <a:r>
+              <a:rPr lang="pl-PL" dirty="0" smtClean="0"/>
+              <a:t>Layers implementation</a:t>
+            </a:r>
+            <a:endParaRPr lang="en-US" dirty="0"/>
+          </a:p>
+        </p:txBody>
+      </p:sp>
+      <p:sp>
+        <p:nvSpPr>
+          <p:cNvPr id="3" name="Content Placeholder 2"/>
+          <p:cNvSpPr>
+            <a:spLocks noGrp="1"/>
+          </p:cNvSpPr>
+          <p:nvPr>
+            <p:ph idx="1"/>
+          </p:nvPr>
+        </p:nvSpPr>
+        <p:spPr/>
+        <p:txBody>
+          <a:bodyPr/>
+          <a:lstStyle/>
+          <a:p>
+            <a:r>
+              <a:rPr lang="pl-PL" dirty="0" smtClean="0"/>
+              <a:t>Layers are:</a:t>
+            </a:r>
+          </a:p>
+          <a:p>
+            <a:pPr lvl="1"/>
+            <a:r>
+              <a:rPr lang="pl-PL" sz="2400" dirty="0" smtClean="0"/>
+              <a:t>Scripts / functions </a:t>
+            </a:r>
+          </a:p>
+          <a:p>
+            <a:pPr lvl="1"/>
+            <a:r>
+              <a:rPr lang="pl-PL" sz="2400" dirty="0" smtClean="0"/>
+              <a:t>Classes</a:t>
+            </a:r>
+          </a:p>
+          <a:p>
+            <a:pPr lvl="1"/>
+            <a:r>
+              <a:rPr lang="pl-PL" sz="2400" dirty="0" smtClean="0"/>
+              <a:t>Packages</a:t>
+            </a:r>
+          </a:p>
+          <a:p>
+            <a:r>
+              <a:rPr lang="pl-PL" dirty="0" smtClean="0"/>
+              <a:t>Layer affiliation, replacement test</a:t>
+            </a:r>
+          </a:p>
+          <a:p>
+            <a:endParaRPr lang="en-US" dirty="0"/>
+          </a:p>
+        </p:txBody>
+      </p:sp>
+    </p:spTree>
+  </p:cSld>
+  <p:clrMapOvr>
+    <a:masterClrMapping/>
+  </p:clrMapOvr>
+</p:sld>
+</file>
+
+<file path=ppt/slides/slide12.xml><?xml version="1.0" encoding="utf-8"?>
+<p:sld xmlns:a="http://schemas.openxmlformats.org/drawingml/2006/main" xmlns:r="http://schemas.openxmlformats.org/officeDocument/2006/relationships" xmlns:p="http://schemas.openxmlformats.org/presentationml/2006/main">
+  <p:cSld>
+    <p:spTree>
+      <p:nvGrpSpPr>
+        <p:cNvPr id="1" name=""/>
+        <p:cNvGrpSpPr/>
+        <p:nvPr/>
+      </p:nvGrpSpPr>
+      <p:grpSpPr>
+        <a:xfrm>
+          <a:off x="0" y="0"/>
+          <a:ext cx="0" cy="0"/>
+          <a:chOff x="0" y="0"/>
+          <a:chExt cx="0" cy="0"/>
+        </a:xfrm>
+      </p:grpSpPr>
+      <p:sp>
+        <p:nvSpPr>
+          <p:cNvPr id="2" name="Title 1"/>
+          <p:cNvSpPr>
+            <a:spLocks noGrp="1"/>
+          </p:cNvSpPr>
+          <p:nvPr>
+            <p:ph type="title"/>
+          </p:nvPr>
+        </p:nvSpPr>
+        <p:spPr/>
+        <p:txBody>
+          <a:bodyPr/>
+          <a:lstStyle/>
+          <a:p>
+            <a:r>
+              <a:rPr lang="pl-PL" dirty="0" smtClean="0"/>
+              <a:t>Layers distribution</a:t>
+            </a:r>
+            <a:endParaRPr lang="en-US" dirty="0"/>
+          </a:p>
+        </p:txBody>
+      </p:sp>
+      <p:sp>
+        <p:nvSpPr>
+          <p:cNvPr id="3" name="Content Placeholder 2"/>
+          <p:cNvSpPr>
+            <a:spLocks noGrp="1"/>
+          </p:cNvSpPr>
+          <p:nvPr>
+            <p:ph idx="1"/>
+          </p:nvPr>
+        </p:nvSpPr>
+        <p:spPr/>
+        <p:txBody>
+          <a:bodyPr/>
+          <a:lstStyle/>
+          <a:p>
+            <a:r>
+              <a:rPr lang="pl-PL" dirty="0" smtClean="0"/>
+              <a:t>Layers enable physical distribution</a:t>
+            </a:r>
+          </a:p>
+          <a:p>
+            <a:r>
+              <a:rPr lang="pl-PL" dirty="0" smtClean="0"/>
+              <a:t>Clear mapping between functionality and corresponding code </a:t>
+            </a:r>
+          </a:p>
+          <a:p>
+            <a:r>
+              <a:rPr lang="pl-PL" dirty="0" smtClean="0"/>
+              <a:t>Emphasis on coarse grained, non-distributed domain layer</a:t>
+            </a:r>
+          </a:p>
+          <a:p>
+            <a:r>
+              <a:rPr lang="pl-PL" dirty="0" smtClean="0"/>
+              <a:t>Non-splitted layers between nodes – physical and logical, complexity boosters</a:t>
+            </a:r>
+            <a:endParaRPr lang="en-US" dirty="0"/>
+          </a:p>
+        </p:txBody>
+      </p:sp>
+    </p:spTree>
+  </p:cSld>
+  <p:clrMapOvr>
+    <a:masterClrMapping/>
+  </p:clrMapOvr>
+</p:sld>
+</file>
+
+<file path=ppt/slides/slide2.xml><?xml version="1.0" encoding="utf-8"?>
+<p:sld xmlns:a="http://schemas.openxmlformats.org/drawingml/2006/main" xmlns:r="http://schemas.openxmlformats.org/officeDocument/2006/relationships" xmlns:p="http://schemas.openxmlformats.org/presentationml/2006/main">
+  <p:cSld>
+    <p:spTree>
+      <p:nvGrpSpPr>
+        <p:cNvPr id="1" name=""/>
+        <p:cNvGrpSpPr/>
+        <p:nvPr/>
+      </p:nvGrpSpPr>
+      <p:grpSpPr>
+        <a:xfrm>
+          <a:off x="0" y="0"/>
+          <a:ext cx="0" cy="0"/>
+          <a:chOff x="0" y="0"/>
+          <a:chExt cx="0" cy="0"/>
+        </a:xfrm>
+      </p:grpSpPr>
+      <p:sp>
+        <p:nvSpPr>
+          <p:cNvPr id="2" name="Title 1"/>
+          <p:cNvSpPr>
+            <a:spLocks noGrp="1"/>
+          </p:cNvSpPr>
+          <p:nvPr>
+            <p:ph type="title"/>
+          </p:nvPr>
+        </p:nvSpPr>
+        <p:spPr/>
+        <p:txBody>
+          <a:bodyPr/>
+          <a:lstStyle/>
+          <a:p>
+            <a:r>
+              <a:rPr lang="pl-PL" dirty="0" smtClean="0"/>
+              <a:t>Architecture</a:t>
+            </a:r>
+            <a:endParaRPr lang="en-US" dirty="0"/>
+          </a:p>
+        </p:txBody>
+      </p:sp>
+      <p:sp>
+        <p:nvSpPr>
+          <p:cNvPr id="3" name="Content Placeholder 2"/>
+          <p:cNvSpPr>
+            <a:spLocks noGrp="1"/>
+          </p:cNvSpPr>
+          <p:nvPr>
+            <p:ph idx="1"/>
+          </p:nvPr>
+        </p:nvSpPr>
+        <p:spPr/>
+        <p:txBody>
+          <a:bodyPr/>
+          <a:lstStyle/>
+          <a:p>
+            <a:r>
+              <a:rPr lang="pl-PL" dirty="0" smtClean="0"/>
+              <a:t>Subjective system’s vision, common definition of components and their interconnections, also:</a:t>
+            </a:r>
+          </a:p>
+          <a:p>
+            <a:r>
+              <a:rPr lang="pl-PL" dirty="0" smtClean="0"/>
+              <a:t>Practices that define software design and decomposition into structures</a:t>
+            </a:r>
+          </a:p>
+        </p:txBody>
+      </p:sp>
+    </p:spTree>
+  </p:cSld>
+  <p:clrMapOvr>
+    <a:masterClrMapping/>
+  </p:clrMapOvr>
+</p:sld>
+</file>
+
+<file path=ppt/slides/slide3.xml><?xml version="1.0" encoding="utf-8"?>
+<p:sld xmlns:a="http://schemas.openxmlformats.org/drawingml/2006/main" xmlns:r="http://schemas.openxmlformats.org/officeDocument/2006/relationships" xmlns:p="http://schemas.openxmlformats.org/presentationml/2006/main">
+  <p:cSld>
+    <p:spTree>
+      <p:nvGrpSpPr>
+        <p:cNvPr id="1" name=""/>
+        <p:cNvGrpSpPr/>
+        <p:nvPr/>
+      </p:nvGrpSpPr>
+      <p:grpSpPr>
+        <a:xfrm>
+          <a:off x="0" y="0"/>
+          <a:ext cx="0" cy="0"/>
+          <a:chOff x="0" y="0"/>
+          <a:chExt cx="0" cy="0"/>
+        </a:xfrm>
+      </p:grpSpPr>
+      <p:sp>
+        <p:nvSpPr>
+          <p:cNvPr id="2" name="Title 1"/>
+          <p:cNvSpPr>
+            <a:spLocks noGrp="1"/>
+          </p:cNvSpPr>
+          <p:nvPr>
+            <p:ph type="title"/>
+          </p:nvPr>
+        </p:nvSpPr>
+        <p:spPr/>
+        <p:txBody>
+          <a:bodyPr/>
+          <a:lstStyle/>
+          <a:p>
+            <a:r>
+              <a:rPr lang="pl-PL" dirty="0" smtClean="0"/>
+              <a:t>Architecture Patterns</a:t>
+            </a:r>
+            <a:endParaRPr lang="en-US" dirty="0"/>
+          </a:p>
+        </p:txBody>
+      </p:sp>
+      <p:sp>
+        <p:nvSpPr>
+          <p:cNvPr id="3" name="Content Placeholder 2"/>
+          <p:cNvSpPr>
+            <a:spLocks noGrp="1"/>
+          </p:cNvSpPr>
+          <p:nvPr>
+            <p:ph idx="1"/>
+          </p:nvPr>
+        </p:nvSpPr>
+        <p:spPr/>
+        <p:txBody>
+          <a:bodyPr/>
+          <a:lstStyle/>
+          <a:p>
+            <a:r>
+              <a:rPr lang="pl-PL" dirty="0" smtClean="0"/>
+              <a:t>Architecture patterns are general, reusable solution to commonly occuring problem</a:t>
+            </a:r>
+          </a:p>
+          <a:p>
+            <a:r>
+              <a:rPr lang="pl-PL" dirty="0" smtClean="0"/>
+              <a:t>Help make decisions about architecture</a:t>
+            </a:r>
+          </a:p>
+          <a:p>
+            <a:r>
+              <a:rPr lang="pl-PL" dirty="0" smtClean="0"/>
+              <a:t>Not out-of the box solutions, frequently adjusted to context</a:t>
+            </a:r>
+          </a:p>
+          <a:p>
+            <a:r>
+              <a:rPr lang="pl-PL" dirty="0" smtClean="0"/>
+              <a:t>Dictionary of typical problem-solution or software structures</a:t>
+            </a:r>
+            <a:endParaRPr lang="en-US" dirty="0" smtClean="0"/>
+          </a:p>
+          <a:p>
+            <a:endParaRPr lang="en-US" dirty="0"/>
+          </a:p>
+        </p:txBody>
+      </p:sp>
+    </p:spTree>
+  </p:cSld>
+  <p:clrMapOvr>
+    <a:masterClrMapping/>
+  </p:clrMapOvr>
+</p:sld>
+</file>
+
+<file path=ppt/slides/slide4.xml><?xml version="1.0" encoding="utf-8"?>
+<p:sld xmlns:a="http://schemas.openxmlformats.org/drawingml/2006/main" xmlns:r="http://schemas.openxmlformats.org/officeDocument/2006/relationships" xmlns:p="http://schemas.openxmlformats.org/presentationml/2006/main">
+  <p:cSld>
+    <p:spTree>
+      <p:nvGrpSpPr>
+        <p:cNvPr id="1" name=""/>
+        <p:cNvGrpSpPr/>
+        <p:nvPr/>
+      </p:nvGrpSpPr>
+      <p:grpSpPr>
+        <a:xfrm>
+          <a:off x="0" y="0"/>
+          <a:ext cx="0" cy="0"/>
+          <a:chOff x="0" y="0"/>
+          <a:chExt cx="0" cy="0"/>
+        </a:xfrm>
+      </p:grpSpPr>
+      <p:sp>
+        <p:nvSpPr>
+          <p:cNvPr id="2" name="Tytuł 1"/>
+          <p:cNvSpPr>
+            <a:spLocks noGrp="1"/>
+          </p:cNvSpPr>
+          <p:nvPr>
+            <p:ph type="title"/>
+          </p:nvPr>
+        </p:nvSpPr>
+        <p:spPr/>
+        <p:txBody>
+          <a:bodyPr/>
+          <a:lstStyle/>
+          <a:p>
+            <a:r>
+              <a:rPr lang="pl-PL" dirty="0" err="1" smtClean="0"/>
+              <a:t>Tiers</a:t>
+            </a:r>
+            <a:r>
+              <a:rPr lang="pl-PL" dirty="0" smtClean="0"/>
+              <a:t> and </a:t>
+            </a:r>
+            <a:r>
+              <a:rPr lang="pl-PL" dirty="0" err="1" smtClean="0"/>
+              <a:t>layers</a:t>
+            </a:r>
+            <a:endParaRPr lang="pl-PL" dirty="0"/>
+          </a:p>
+        </p:txBody>
+      </p:sp>
+      <p:sp>
+        <p:nvSpPr>
+          <p:cNvPr id="3" name="Symbol zastępczy zawartości 2"/>
+          <p:cNvSpPr>
+            <a:spLocks noGrp="1"/>
+          </p:cNvSpPr>
+          <p:nvPr>
+            <p:ph idx="1"/>
+          </p:nvPr>
+        </p:nvSpPr>
+        <p:spPr/>
+        <p:txBody>
+          <a:bodyPr/>
+          <a:lstStyle/>
+          <a:p>
+            <a:r>
+              <a:rPr lang="pl-PL" dirty="0" err="1" smtClean="0"/>
+              <a:t>Two-tiers</a:t>
+            </a:r>
+            <a:r>
+              <a:rPr lang="pl-PL" dirty="0" smtClean="0"/>
+              <a:t> </a:t>
+            </a:r>
+            <a:r>
+              <a:rPr lang="pl-PL" dirty="0" err="1" smtClean="0"/>
+              <a:t>architecture</a:t>
+            </a:r>
+            <a:r>
+              <a:rPr lang="pl-PL" dirty="0" smtClean="0"/>
+              <a:t> = </a:t>
+            </a:r>
+            <a:r>
+              <a:rPr lang="pl-PL" dirty="0" err="1" smtClean="0"/>
+              <a:t>client</a:t>
+            </a:r>
+            <a:r>
+              <a:rPr lang="pl-PL" dirty="0" smtClean="0"/>
+              <a:t>  + SQL</a:t>
+            </a:r>
+          </a:p>
+          <a:p>
+            <a:r>
+              <a:rPr lang="pl-PL" dirty="0" smtClean="0"/>
+              <a:t>No place for business </a:t>
+            </a:r>
+            <a:r>
+              <a:rPr lang="pl-PL" dirty="0" err="1" smtClean="0"/>
+              <a:t>logic</a:t>
+            </a:r>
+            <a:r>
+              <a:rPr lang="pl-PL" dirty="0" smtClean="0"/>
+              <a:t>, </a:t>
+            </a:r>
+            <a:r>
+              <a:rPr lang="pl-PL" dirty="0" err="1" smtClean="0"/>
+              <a:t>validation</a:t>
+            </a:r>
+            <a:r>
+              <a:rPr lang="pl-PL" dirty="0" smtClean="0"/>
+              <a:t>, </a:t>
+            </a:r>
+            <a:r>
+              <a:rPr lang="pl-PL" dirty="0" err="1" smtClean="0"/>
+              <a:t>rules</a:t>
+            </a:r>
+            <a:r>
+              <a:rPr lang="pl-PL" dirty="0" smtClean="0"/>
+              <a:t>, </a:t>
+            </a:r>
+            <a:r>
+              <a:rPr lang="pl-PL" dirty="0" err="1" smtClean="0"/>
+              <a:t>computation</a:t>
+            </a:r>
+            <a:r>
+              <a:rPr lang="pl-PL" dirty="0" smtClean="0"/>
+              <a:t> etc. UI? </a:t>
+            </a:r>
+            <a:r>
+              <a:rPr lang="pl-PL" dirty="0" err="1" smtClean="0"/>
+              <a:t>Db</a:t>
+            </a:r>
+            <a:r>
+              <a:rPr lang="pl-PL" dirty="0" smtClean="0"/>
+              <a:t>?</a:t>
+            </a:r>
+          </a:p>
+          <a:p>
+            <a:r>
+              <a:rPr lang="pl-PL" dirty="0" smtClean="0"/>
+              <a:t>(</a:t>
+            </a:r>
+            <a:r>
+              <a:rPr lang="pl-PL" dirty="0" err="1" smtClean="0"/>
+              <a:t>Logical</a:t>
+            </a:r>
+            <a:r>
+              <a:rPr lang="pl-PL" dirty="0" smtClean="0"/>
+              <a:t>) l</a:t>
+            </a:r>
+            <a:r>
+              <a:rPr lang="en-US" dirty="0" err="1" smtClean="0"/>
+              <a:t>ayers</a:t>
+            </a:r>
+            <a:r>
+              <a:rPr lang="en-US" dirty="0" smtClean="0"/>
+              <a:t> are </a:t>
+            </a:r>
+            <a:r>
+              <a:rPr lang="en-US" dirty="0" smtClean="0"/>
+              <a:t>a </a:t>
+            </a:r>
+            <a:r>
+              <a:rPr lang="en-US" dirty="0" smtClean="0"/>
+              <a:t>way of organizing </a:t>
+            </a:r>
+            <a:r>
+              <a:rPr lang="en-US" dirty="0" smtClean="0"/>
+              <a:t>code</a:t>
+            </a:r>
+            <a:endParaRPr lang="pl-PL" dirty="0" smtClean="0"/>
+          </a:p>
+          <a:p>
+            <a:r>
+              <a:rPr lang="pl-PL" dirty="0" smtClean="0"/>
+              <a:t>(</a:t>
+            </a:r>
+            <a:r>
+              <a:rPr lang="en-US" dirty="0" smtClean="0"/>
+              <a:t>Physical</a:t>
+            </a:r>
+            <a:r>
+              <a:rPr lang="pl-PL" dirty="0" smtClean="0"/>
+              <a:t>)</a:t>
+            </a:r>
+            <a:r>
+              <a:rPr lang="en-US" dirty="0" smtClean="0"/>
+              <a:t> </a:t>
+            </a:r>
+            <a:r>
+              <a:rPr lang="pl-PL" dirty="0" smtClean="0"/>
+              <a:t>t</a:t>
+            </a:r>
+            <a:r>
+              <a:rPr lang="en-US" dirty="0" err="1" smtClean="0"/>
+              <a:t>iers</a:t>
+            </a:r>
+            <a:r>
+              <a:rPr lang="en-US" dirty="0" smtClean="0"/>
+              <a:t> </a:t>
+            </a:r>
+            <a:r>
+              <a:rPr lang="en-US" dirty="0" smtClean="0"/>
+              <a:t>are only about </a:t>
+            </a:r>
+            <a:r>
+              <a:rPr lang="en-US" dirty="0" smtClean="0"/>
+              <a:t>where the code </a:t>
+            </a:r>
+            <a:r>
+              <a:rPr lang="en-US" dirty="0" smtClean="0"/>
+              <a:t>runs</a:t>
+            </a:r>
+            <a:r>
+              <a:rPr lang="pl-PL" dirty="0" smtClean="0"/>
+              <a:t>. T</a:t>
+            </a:r>
+            <a:r>
+              <a:rPr lang="en-US" dirty="0" err="1" smtClean="0"/>
+              <a:t>iers</a:t>
+            </a:r>
+            <a:r>
+              <a:rPr lang="en-US" dirty="0" smtClean="0"/>
+              <a:t> </a:t>
+            </a:r>
+            <a:r>
+              <a:rPr lang="en-US" dirty="0" smtClean="0"/>
+              <a:t>are places where layers are deployed</a:t>
+            </a:r>
+            <a:endParaRPr lang="pl-PL" dirty="0"/>
+          </a:p>
+        </p:txBody>
+      </p:sp>
+    </p:spTree>
+  </p:cSld>
+  <p:clrMapOvr>
+    <a:masterClrMapping/>
+  </p:clrMapOvr>
+</p:sld>
+</file>
+
+<file path=ppt/slides/slide5.xml><?xml version="1.0" encoding="utf-8"?>
+<p:sld xmlns:a="http://schemas.openxmlformats.org/drawingml/2006/main" xmlns:r="http://schemas.openxmlformats.org/officeDocument/2006/relationships" xmlns:p="http://schemas.openxmlformats.org/presentationml/2006/main">
+  <p:cSld>
+    <p:spTree>
+      <p:nvGrpSpPr>
+        <p:cNvPr id="1" name=""/>
+        <p:cNvGrpSpPr/>
+        <p:nvPr/>
+      </p:nvGrpSpPr>
+      <p:grpSpPr>
+        <a:xfrm>
+          <a:off x="0" y="0"/>
+          <a:ext cx="0" cy="0"/>
+          <a:chOff x="0" y="0"/>
+          <a:chExt cx="0" cy="0"/>
+        </a:xfrm>
+      </p:grpSpPr>
+      <p:pic>
+        <p:nvPicPr>
+          <p:cNvPr id="1026" name="Picture 2" descr="http://farm6.staticflickr.com/5259/5506258524_bafd18d805.jpg"/>
+          <p:cNvPicPr>
+            <a:picLocks noChangeAspect="1" noChangeArrowheads="1"/>
+          </p:cNvPicPr>
+          <p:nvPr/>
+        </p:nvPicPr>
+        <p:blipFill>
+          <a:blip r:embed="rId2" cstate="print"/>
+          <a:srcRect/>
+          <a:stretch>
+            <a:fillRect/>
+          </a:stretch>
+        </p:blipFill>
+        <p:spPr bwMode="auto">
+          <a:xfrm>
+            <a:off x="2627784" y="1436778"/>
+            <a:ext cx="3499867" cy="4666489"/>
+          </a:xfrm>
+          <a:prstGeom prst="rect">
+            <a:avLst/>
+          </a:prstGeom>
+          <a:noFill/>
+        </p:spPr>
+      </p:pic>
+      <p:sp>
+        <p:nvSpPr>
+          <p:cNvPr id="5" name="Tytuł 1"/>
+          <p:cNvSpPr>
+            <a:spLocks noGrp="1"/>
+          </p:cNvSpPr>
+          <p:nvPr>
+            <p:ph type="title"/>
+          </p:nvPr>
+        </p:nvSpPr>
+        <p:spPr>
+          <a:xfrm>
+            <a:off x="457200" y="274638"/>
+            <a:ext cx="8229600" cy="1143000"/>
+          </a:xfrm>
+        </p:spPr>
+        <p:txBody>
+          <a:bodyPr/>
+          <a:lstStyle/>
+          <a:p>
+            <a:r>
+              <a:rPr lang="pl-PL" dirty="0" err="1" smtClean="0"/>
+              <a:t>Three</a:t>
+            </a:r>
+            <a:r>
+              <a:rPr lang="pl-PL" dirty="0" smtClean="0"/>
+              <a:t> </a:t>
+            </a:r>
+            <a:r>
+              <a:rPr lang="pl-PL" dirty="0" err="1" smtClean="0"/>
+              <a:t>tier</a:t>
+            </a:r>
+            <a:r>
+              <a:rPr lang="pl-PL" dirty="0" smtClean="0"/>
+              <a:t> </a:t>
+            </a:r>
+            <a:r>
+              <a:rPr lang="pl-PL" dirty="0" err="1" smtClean="0"/>
+              <a:t>architecture</a:t>
+            </a:r>
+            <a:endParaRPr lang="pl-PL" dirty="0"/>
+          </a:p>
+        </p:txBody>
+      </p:sp>
+    </p:spTree>
+  </p:cSld>
+  <p:clrMapOvr>
+    <a:masterClrMapping/>
+  </p:clrMapOvr>
+</p:sld>
+</file>
+
+<file path=ppt/slides/slide6.xml><?xml version="1.0" encoding="utf-8"?>
+<p:sld xmlns:a="http://schemas.openxmlformats.org/drawingml/2006/main" xmlns:r="http://schemas.openxmlformats.org/officeDocument/2006/relationships" xmlns:p="http://schemas.openxmlformats.org/presentationml/2006/main">
+  <p:cSld>
+    <p:spTree>
+      <p:nvGrpSpPr>
+        <p:cNvPr id="1" name=""/>
+        <p:cNvGrpSpPr/>
+        <p:nvPr/>
+      </p:nvGrpSpPr>
+      <p:grpSpPr>
+        <a:xfrm>
+          <a:off x="0" y="0"/>
+          <a:ext cx="0" cy="0"/>
+          <a:chOff x="0" y="0"/>
+          <a:chExt cx="0" cy="0"/>
+        </a:xfrm>
+      </p:grpSpPr>
+      <p:sp>
+        <p:nvSpPr>
+          <p:cNvPr id="2" name="Tytuł 1"/>
+          <p:cNvSpPr>
+            <a:spLocks noGrp="1"/>
+          </p:cNvSpPr>
+          <p:nvPr>
+            <p:ph type="title"/>
+          </p:nvPr>
+        </p:nvSpPr>
+        <p:spPr/>
+        <p:txBody>
+          <a:bodyPr/>
+          <a:lstStyle/>
+          <a:p>
+            <a:r>
+              <a:rPr lang="pl-PL" dirty="0" err="1" smtClean="0"/>
+              <a:t>Three</a:t>
+            </a:r>
+            <a:r>
+              <a:rPr lang="pl-PL" dirty="0" smtClean="0"/>
+              <a:t> </a:t>
+            </a:r>
+            <a:r>
+              <a:rPr lang="pl-PL" dirty="0" err="1" smtClean="0"/>
+              <a:t>tier</a:t>
+            </a:r>
+            <a:r>
+              <a:rPr lang="pl-PL" dirty="0" smtClean="0"/>
+              <a:t> </a:t>
+            </a:r>
+            <a:r>
+              <a:rPr lang="pl-PL" dirty="0" err="1" smtClean="0"/>
+              <a:t>architecture</a:t>
+            </a:r>
+            <a:endParaRPr lang="pl-PL" dirty="0"/>
+          </a:p>
+        </p:txBody>
+      </p:sp>
+      <p:pic>
+        <p:nvPicPr>
+          <p:cNvPr id="15363" name="Picture 3"/>
+          <p:cNvPicPr>
+            <a:picLocks noChangeAspect="1" noChangeArrowheads="1"/>
+          </p:cNvPicPr>
+          <p:nvPr/>
+        </p:nvPicPr>
+        <p:blipFill>
+          <a:blip r:embed="rId2" cstate="print"/>
+          <a:srcRect/>
+          <a:stretch>
+            <a:fillRect/>
+          </a:stretch>
+        </p:blipFill>
+        <p:spPr bwMode="auto">
+          <a:xfrm>
+            <a:off x="1691680" y="1340768"/>
+            <a:ext cx="5610200" cy="5021129"/>
+          </a:xfrm>
+          <a:prstGeom prst="rect">
+            <a:avLst/>
+          </a:prstGeom>
+          <a:noFill/>
+          <a:ln w="9525">
+            <a:noFill/>
+            <a:miter lim="800000"/>
+            <a:headEnd/>
+            <a:tailEnd/>
+          </a:ln>
+        </p:spPr>
+      </p:pic>
+      <p:sp>
+        <p:nvSpPr>
+          <p:cNvPr id="4" name="TextBox 3"/>
+          <p:cNvSpPr txBox="1"/>
+          <p:nvPr/>
+        </p:nvSpPr>
+        <p:spPr>
+          <a:xfrm>
+            <a:off x="467544" y="6453336"/>
+            <a:ext cx="4968552" cy="276999"/>
+          </a:xfrm>
+          <a:prstGeom prst="rect">
+            <a:avLst/>
+          </a:prstGeom>
+          <a:noFill/>
+        </p:spPr>
+        <p:txBody>
+          <a:bodyPr wrap="square" rtlCol="0">
+            <a:spAutoFit/>
+          </a:bodyPr>
+          <a:lstStyle/>
+          <a:p>
+            <a:r>
+              <a:rPr lang="en-US" sz="1200" dirty="0" smtClean="0"/>
+              <a:t>http://en.wikipedia.org/wiki/Multitier_architecture</a:t>
+            </a:r>
+            <a:endParaRPr lang="en-US" sz="1200" dirty="0"/>
+          </a:p>
+        </p:txBody>
+      </p:sp>
+    </p:spTree>
+  </p:cSld>
+  <p:clrMapOvr>
+    <a:masterClrMapping/>
+  </p:clrMapOvr>
+</p:sld>
+</file>
+
+<file path=ppt/slides/slide7.xml><?xml version="1.0" encoding="utf-8"?>
+<p:sld xmlns:a="http://schemas.openxmlformats.org/drawingml/2006/main" xmlns:r="http://schemas.openxmlformats.org/officeDocument/2006/relationships" xmlns:p="http://schemas.openxmlformats.org/presentationml/2006/main">
+  <p:cSld>
+    <p:spTree>
+      <p:nvGrpSpPr>
+        <p:cNvPr id="1" name=""/>
+        <p:cNvGrpSpPr/>
+        <p:nvPr/>
+      </p:nvGrpSpPr>
+      <p:grpSpPr>
+        <a:xfrm>
+          <a:off x="0" y="0"/>
+          <a:ext cx="0" cy="0"/>
+          <a:chOff x="0" y="0"/>
+          <a:chExt cx="0" cy="0"/>
+        </a:xfrm>
+      </p:grpSpPr>
+      <p:sp>
+        <p:nvSpPr>
+          <p:cNvPr id="2" name="Title 1"/>
+          <p:cNvSpPr>
+            <a:spLocks noGrp="1"/>
+          </p:cNvSpPr>
+          <p:nvPr>
+            <p:ph type="title"/>
+          </p:nvPr>
+        </p:nvSpPr>
+        <p:spPr/>
+        <p:txBody>
+          <a:bodyPr/>
+          <a:lstStyle/>
+          <a:p>
+            <a:r>
+              <a:rPr lang="pl-PL" dirty="0" smtClean="0"/>
+              <a:t>Hexagonal architecture</a:t>
+            </a:r>
+            <a:endParaRPr lang="en-US" dirty="0"/>
+          </a:p>
+        </p:txBody>
+      </p:sp>
+      <p:sp>
+        <p:nvSpPr>
+          <p:cNvPr id="3" name="Content Placeholder 2"/>
+          <p:cNvSpPr>
+            <a:spLocks noGrp="1"/>
+          </p:cNvSpPr>
+          <p:nvPr>
+            <p:ph idx="1"/>
+          </p:nvPr>
+        </p:nvSpPr>
+        <p:spPr>
+          <a:xfrm>
+            <a:off x="457200" y="1600200"/>
+            <a:ext cx="4690864" cy="4421088"/>
+          </a:xfrm>
+        </p:spPr>
+        <p:txBody>
+          <a:bodyPr/>
+          <a:lstStyle/>
+          <a:p>
+            <a:r>
+              <a:rPr lang="en-US" dirty="0" smtClean="0"/>
+              <a:t>avoid layer-to-layer dependencies usually associated with the N-tier architecture approach</a:t>
+            </a:r>
+            <a:r>
+              <a:rPr lang="pl-PL" dirty="0" smtClean="0"/>
+              <a:t> </a:t>
+            </a:r>
+            <a:r>
+              <a:rPr lang="en-US" dirty="0" smtClean="0"/>
+              <a:t>by placing all infrastructure, including databases, outside the problem domain</a:t>
+            </a:r>
+            <a:endParaRPr lang="en-US" dirty="0"/>
+          </a:p>
+        </p:txBody>
+      </p:sp>
+      <p:pic>
+        <p:nvPicPr>
+          <p:cNvPr id="4" name="Picture 2" descr="http://alistair.cockburn.us/get/2301"/>
+          <p:cNvPicPr>
+            <a:picLocks noChangeAspect="1" noChangeArrowheads="1"/>
+          </p:cNvPicPr>
+          <p:nvPr/>
+        </p:nvPicPr>
+        <p:blipFill>
+          <a:blip r:embed="rId2" cstate="print"/>
+          <a:srcRect/>
+          <a:stretch>
+            <a:fillRect/>
+          </a:stretch>
+        </p:blipFill>
+        <p:spPr bwMode="auto">
+          <a:xfrm>
+            <a:off x="5076056" y="2060848"/>
+            <a:ext cx="3409950" cy="2276475"/>
+          </a:xfrm>
+          <a:prstGeom prst="rect">
+            <a:avLst/>
+          </a:prstGeom>
+          <a:noFill/>
+        </p:spPr>
+      </p:pic>
+      <p:sp>
+        <p:nvSpPr>
+          <p:cNvPr id="6" name="TextBox 5"/>
+          <p:cNvSpPr txBox="1"/>
+          <p:nvPr/>
+        </p:nvSpPr>
+        <p:spPr>
+          <a:xfrm>
+            <a:off x="539552" y="5949280"/>
+            <a:ext cx="8208912" cy="276999"/>
+          </a:xfrm>
+          <a:prstGeom prst="rect">
+            <a:avLst/>
+          </a:prstGeom>
+          <a:noFill/>
+        </p:spPr>
+        <p:txBody>
+          <a:bodyPr wrap="square" rtlCol="0">
+            <a:spAutoFit/>
+          </a:bodyPr>
+          <a:lstStyle/>
+          <a:p>
+            <a:r>
+              <a:rPr lang="en-US" sz="1200" dirty="0" smtClean="0"/>
+              <a:t>http://alistair.cockburn.us/Hexagonal+architecture</a:t>
+            </a:r>
+            <a:endParaRPr lang="en-US" sz="1200" dirty="0"/>
+          </a:p>
+        </p:txBody>
+      </p:sp>
+    </p:spTree>
+  </p:cSld>
+  <p:clrMapOvr>
+    <a:masterClrMapping/>
+  </p:clrMapOvr>
+</p:sld>
+</file>
+
+<file path=ppt/slides/slide8.xml><?xml version="1.0" encoding="utf-8"?>
+<p:sld xmlns:a="http://schemas.openxmlformats.org/drawingml/2006/main" xmlns:r="http://schemas.openxmlformats.org/officeDocument/2006/relationships" xmlns:p="http://schemas.openxmlformats.org/presentationml/2006/main">
+  <p:cSld>
+    <p:spTree>
+      <p:nvGrpSpPr>
+        <p:cNvPr id="1" name=""/>
+        <p:cNvGrpSpPr/>
+        <p:nvPr/>
+      </p:nvGrpSpPr>
+      <p:grpSpPr>
+        <a:xfrm>
+          <a:off x="0" y="0"/>
+          <a:ext cx="0" cy="0"/>
+          <a:chOff x="0" y="0"/>
+          <a:chExt cx="0" cy="0"/>
+        </a:xfrm>
+      </p:grpSpPr>
+      <p:sp>
+        <p:nvSpPr>
+          <p:cNvPr id="2" name="Title 1"/>
+          <p:cNvSpPr>
+            <a:spLocks noGrp="1"/>
+          </p:cNvSpPr>
+          <p:nvPr>
+            <p:ph type="title"/>
+          </p:nvPr>
+        </p:nvSpPr>
+        <p:spPr/>
+        <p:txBody>
+          <a:bodyPr/>
+          <a:lstStyle/>
+          <a:p>
+            <a:r>
+              <a:rPr lang="pl-PL" dirty="0" smtClean="0"/>
+              <a:t>Hexagonal architecture</a:t>
+            </a:r>
+            <a:endParaRPr lang="en-US" dirty="0"/>
+          </a:p>
+        </p:txBody>
+      </p:sp>
+      <p:pic>
+        <p:nvPicPr>
+          <p:cNvPr id="1028" name="Picture 4" descr="http://alistair.cockburn.us/get/2302"/>
+          <p:cNvPicPr>
+            <a:picLocks noChangeAspect="1" noChangeArrowheads="1"/>
+          </p:cNvPicPr>
+          <p:nvPr/>
+        </p:nvPicPr>
+        <p:blipFill>
+          <a:blip r:embed="rId2" cstate="print"/>
+          <a:srcRect/>
+          <a:stretch>
+            <a:fillRect/>
+          </a:stretch>
+        </p:blipFill>
+        <p:spPr bwMode="auto">
+          <a:xfrm>
+            <a:off x="1979712" y="1628800"/>
+            <a:ext cx="4638675" cy="3476626"/>
+          </a:xfrm>
+          <a:prstGeom prst="rect">
+            <a:avLst/>
+          </a:prstGeom>
+          <a:noFill/>
+        </p:spPr>
+      </p:pic>
+      <p:sp>
+        <p:nvSpPr>
+          <p:cNvPr id="6" name="TextBox 5"/>
+          <p:cNvSpPr txBox="1"/>
+          <p:nvPr/>
+        </p:nvSpPr>
+        <p:spPr>
+          <a:xfrm>
+            <a:off x="539552" y="5949280"/>
+            <a:ext cx="8208912" cy="276999"/>
+          </a:xfrm>
+          <a:prstGeom prst="rect">
+            <a:avLst/>
+          </a:prstGeom>
+          <a:noFill/>
+        </p:spPr>
+        <p:txBody>
+          <a:bodyPr wrap="square" rtlCol="0">
+            <a:spAutoFit/>
+          </a:bodyPr>
+          <a:lstStyle/>
+          <a:p>
+            <a:r>
+              <a:rPr lang="en-US" sz="1200" dirty="0" smtClean="0"/>
+              <a:t>http://alistair.cockburn.us/Hexagonal+architecture</a:t>
+            </a:r>
+            <a:endParaRPr lang="en-US" sz="1200" dirty="0"/>
+          </a:p>
+        </p:txBody>
+      </p:sp>
+    </p:spTree>
+  </p:cSld>
+  <p:clrMapOvr>
+    <a:masterClrMapping/>
+  </p:clrMapOvr>
+</p:sld>
+</file>
+
+<file path=ppt/slides/slide9.xml><?xml version="1.0" encoding="utf-8"?>
+<p:sld xmlns:a="http://schemas.openxmlformats.org/drawingml/2006/main" xmlns:r="http://schemas.openxmlformats.org/officeDocument/2006/relationships" xmlns:p="http://schemas.openxmlformats.org/presentationml/2006/main">
+  <p:cSld>
+    <p:spTree>
+      <p:nvGrpSpPr>
+        <p:cNvPr id="1" name=""/>
+        <p:cNvGrpSpPr/>
+        <p:nvPr/>
+      </p:nvGrpSpPr>
+      <p:grpSpPr>
+        <a:xfrm>
+          <a:off x="0" y="0"/>
+          <a:ext cx="0" cy="0"/>
+          <a:chOff x="0" y="0"/>
+          <a:chExt cx="0" cy="0"/>
+        </a:xfrm>
+      </p:grpSpPr>
+      <p:sp>
+        <p:nvSpPr>
+          <p:cNvPr id="2" name="Title 1"/>
+          <p:cNvSpPr>
+            <a:spLocks noGrp="1"/>
+          </p:cNvSpPr>
+          <p:nvPr>
+            <p:ph type="title"/>
+          </p:nvPr>
+        </p:nvSpPr>
+        <p:spPr/>
+        <p:txBody>
+          <a:bodyPr/>
+          <a:lstStyle/>
+          <a:p>
+            <a:r>
+              <a:rPr lang="pl-PL" dirty="0" smtClean="0"/>
+              <a:t>Independent domain layering</a:t>
+            </a:r>
+            <a:endParaRPr lang="en-US" dirty="0"/>
+          </a:p>
+        </p:txBody>
+      </p:sp>
+      <p:sp>
+        <p:nvSpPr>
+          <p:cNvPr id="4" name="Rectangle 3"/>
+          <p:cNvSpPr/>
+          <p:nvPr/>
+        </p:nvSpPr>
+        <p:spPr>
+          <a:xfrm>
+            <a:off x="1619672" y="1844824"/>
+            <a:ext cx="5832648" cy="792088"/>
+          </a:xfrm>
+          <a:prstGeom prst="rect">
+            <a:avLst/>
+          </a:prstGeom>
+          <a:solidFill>
+            <a:srgbClr val="0070C0"/>
+          </a:solidFill>
+          <a:ln>
+            <a:solidFill>
+              <a:srgbClr val="0070C0"/>
+            </a:solidFill>
+          </a:ln>
+        </p:spPr>
+        <p:style>
+          <a:lnRef idx="2">
+            <a:schemeClr val="accent1">
+              <a:shade val="50000"/>
+            </a:schemeClr>
+          </a:lnRef>
+          <a:fillRef idx="1">
+            <a:schemeClr val="accent1"/>
+          </a:fillRef>
+          <a:effectRef idx="0">
+            <a:schemeClr val="accent1"/>
+          </a:effectRef>
+          <a:fontRef idx="minor">
+            <a:schemeClr val="lt1"/>
+          </a:fontRef>
+        </p:style>
+        <p:txBody>
+          <a:bodyPr rtlCol="0" anchor="ctr"/>
+          <a:lstStyle/>
+          <a:p>
+            <a:pPr algn="ctr"/>
+            <a:r>
+              <a:rPr lang="pl-PL" dirty="0" smtClean="0"/>
+              <a:t>Presentation</a:t>
+            </a:r>
+            <a:endParaRPr lang="en-US" dirty="0"/>
+          </a:p>
+        </p:txBody>
+      </p:sp>
+      <p:sp>
+        <p:nvSpPr>
+          <p:cNvPr id="8" name="Rectangle 7"/>
+          <p:cNvSpPr/>
+          <p:nvPr/>
+        </p:nvSpPr>
+        <p:spPr>
+          <a:xfrm>
+            <a:off x="1619672" y="3429000"/>
+            <a:ext cx="5832648" cy="792088"/>
+          </a:xfrm>
+          <a:prstGeom prst="rect">
+            <a:avLst/>
+          </a:prstGeom>
+          <a:solidFill>
+            <a:schemeClr val="accent3">
+              <a:lumMod val="75000"/>
+            </a:schemeClr>
+          </a:solidFill>
+          <a:ln>
+            <a:solidFill>
+              <a:schemeClr val="accent3">
+                <a:lumMod val="75000"/>
+              </a:schemeClr>
+            </a:solidFill>
+          </a:ln>
+        </p:spPr>
+        <p:style>
+          <a:lnRef idx="2">
+            <a:schemeClr val="accent1">
+              <a:shade val="50000"/>
+            </a:schemeClr>
+          </a:lnRef>
+          <a:fillRef idx="1">
+            <a:schemeClr val="accent1"/>
+          </a:fillRef>
+          <a:effectRef idx="0">
+            <a:schemeClr val="accent1"/>
+          </a:effectRef>
+          <a:fontRef idx="minor">
+            <a:schemeClr val="lt1"/>
+          </a:fontRef>
+        </p:style>
+        <p:txBody>
+          <a:bodyPr rtlCol="0" anchor="ctr"/>
+          <a:lstStyle/>
+          <a:p>
+            <a:pPr algn="ctr"/>
+            <a:r>
+              <a:rPr lang="pl-PL" dirty="0" smtClean="0"/>
+              <a:t>Domain</a:t>
+            </a:r>
+            <a:endParaRPr lang="en-US" dirty="0"/>
+          </a:p>
+        </p:txBody>
+      </p:sp>
+      <p:sp>
+        <p:nvSpPr>
+          <p:cNvPr id="9" name="Rectangle 8"/>
+          <p:cNvSpPr/>
+          <p:nvPr/>
+        </p:nvSpPr>
+        <p:spPr>
+          <a:xfrm>
+            <a:off x="1619672" y="5013176"/>
+            <a:ext cx="5832648" cy="792088"/>
+          </a:xfrm>
+          <a:prstGeom prst="rect">
+            <a:avLst/>
+          </a:prstGeom>
+          <a:solidFill>
+            <a:srgbClr val="FFC000"/>
+          </a:solidFill>
+          <a:ln>
+            <a:solidFill>
+              <a:srgbClr val="FFC000"/>
+            </a:solidFill>
+          </a:ln>
+        </p:spPr>
+        <p:style>
+          <a:lnRef idx="2">
+            <a:schemeClr val="accent1">
+              <a:shade val="50000"/>
+            </a:schemeClr>
+          </a:lnRef>
+          <a:fillRef idx="1">
+            <a:schemeClr val="accent1"/>
+          </a:fillRef>
+          <a:effectRef idx="0">
+            <a:schemeClr val="accent1"/>
+          </a:effectRef>
+          <a:fontRef idx="minor">
+            <a:schemeClr val="lt1"/>
+          </a:fontRef>
+        </p:style>
+        <p:txBody>
+          <a:bodyPr rtlCol="0" anchor="ctr"/>
+          <a:lstStyle/>
+          <a:p>
+            <a:pPr algn="ctr"/>
+            <a:r>
+              <a:rPr lang="pl-PL" dirty="0" smtClean="0"/>
+              <a:t>Infrastructure</a:t>
+            </a:r>
+            <a:endParaRPr lang="en-US" dirty="0"/>
+          </a:p>
+        </p:txBody>
+      </p:sp>
+      <p:cxnSp>
+        <p:nvCxnSpPr>
+          <p:cNvPr id="11" name="Straight Arrow Connector 10"/>
+          <p:cNvCxnSpPr>
+            <a:stCxn id="4" idx="2"/>
+            <a:endCxn id="8" idx="0"/>
+          </p:cNvCxnSpPr>
+          <p:nvPr/>
+        </p:nvCxnSpPr>
+        <p:spPr>
+          <a:xfrm>
+            <a:off x="4535996" y="2636912"/>
+            <a:ext cx="0" cy="792088"/>
+          </a:xfrm>
+          <a:prstGeom prst="straightConnector1">
+            <a:avLst/>
+          </a:prstGeom>
+          <a:ln w="15875">
+            <a:tailEnd type="arrow"/>
+          </a:ln>
+        </p:spPr>
+        <p:style>
+          <a:lnRef idx="1">
+            <a:schemeClr val="accent1"/>
+          </a:lnRef>
+          <a:fillRef idx="0">
+            <a:schemeClr val="accent1"/>
+          </a:fillRef>
+          <a:effectRef idx="0">
+            <a:schemeClr val="accent1"/>
+          </a:effectRef>
+          <a:fontRef idx="minor">
+            <a:schemeClr val="tx1"/>
+          </a:fontRef>
+        </p:style>
+      </p:cxnSp>
+      <p:cxnSp>
+        <p:nvCxnSpPr>
+          <p:cNvPr id="12" name="Straight Arrow Connector 11"/>
+          <p:cNvCxnSpPr/>
+          <p:nvPr/>
+        </p:nvCxnSpPr>
+        <p:spPr>
+          <a:xfrm>
+            <a:off x="4499992" y="4221088"/>
+            <a:ext cx="0" cy="792088"/>
+          </a:xfrm>
+          <a:prstGeom prst="straightConnector1">
+            <a:avLst/>
+          </a:prstGeom>
+          <a:ln w="15875">
+            <a:tailEnd type="arrow"/>
+          </a:ln>
+        </p:spPr>
+        <p:style>
+          <a:lnRef idx="1">
+            <a:schemeClr val="accent1"/>
+          </a:lnRef>
+          <a:fillRef idx="0">
+            <a:schemeClr val="accent1"/>
+          </a:fillRef>
+          <a:effectRef idx="0">
+            <a:schemeClr val="accent1"/>
+          </a:effectRef>
+          <a:fontRef idx="minor">
+            <a:schemeClr val="tx1"/>
+          </a:fontRef>
+        </p:style>
+      </p:cxnSp>
+    </p:spTree>
+  </p:cSld>
+  <p:clrMapOvr>
+    <a:masterClrMapping/>
+  </p:clrMapOvr>
+  <p:timing>
+    <p:tnLst>
+      <p:par>
+        <p:cTn id="1" dur="indefinite" restart="never" nodeType="tmRoot"/>
       </p:par>
     </p:tnLst>
   </p:timing>

</xml_diff>

<commit_message>
added domain logic part
</commit_message>
<xml_diff>
--- a/IntroToArchitecture.pptx
+++ b/IntroToArchitecture.pptx
@@ -17,6 +17,11 @@
     <p:sldId id="262" r:id="rId11"/>
     <p:sldId id="263" r:id="rId12"/>
     <p:sldId id="264" r:id="rId13"/>
+    <p:sldId id="268" r:id="rId14"/>
+    <p:sldId id="269" r:id="rId15"/>
+    <p:sldId id="270" r:id="rId16"/>
+    <p:sldId id="271" r:id="rId17"/>
+    <p:sldId id="272" r:id="rId18"/>
   </p:sldIdLst>
   <p:sldSz cx="9144000" cy="6858000" type="screen4x3"/>
   <p:notesSz cx="6858000" cy="9144000"/>
@@ -300,7 +305,7 @@
             <a:fld id="{9E579FCD-C7FB-4CDF-8CA4-138E1F44076D}" type="datetimeFigureOut">
               <a:rPr lang="pl-PL" smtClean="0"/>
               <a:pPr/>
-              <a:t>2013-12-11</a:t>
+              <a:t>2013-12-20</a:t>
             </a:fld>
             <a:endParaRPr lang="pl-PL"/>
           </a:p>
@@ -467,7 +472,7 @@
             <a:fld id="{9E579FCD-C7FB-4CDF-8CA4-138E1F44076D}" type="datetimeFigureOut">
               <a:rPr lang="pl-PL" smtClean="0"/>
               <a:pPr/>
-              <a:t>2013-12-11</a:t>
+              <a:t>2013-12-20</a:t>
             </a:fld>
             <a:endParaRPr lang="pl-PL"/>
           </a:p>
@@ -644,7 +649,7 @@
             <a:fld id="{9E579FCD-C7FB-4CDF-8CA4-138E1F44076D}" type="datetimeFigureOut">
               <a:rPr lang="pl-PL" smtClean="0"/>
               <a:pPr/>
-              <a:t>2013-12-11</a:t>
+              <a:t>2013-12-20</a:t>
             </a:fld>
             <a:endParaRPr lang="pl-PL"/>
           </a:p>
@@ -811,7 +816,7 @@
             <a:fld id="{9E579FCD-C7FB-4CDF-8CA4-138E1F44076D}" type="datetimeFigureOut">
               <a:rPr lang="pl-PL" smtClean="0"/>
               <a:pPr/>
-              <a:t>2013-12-11</a:t>
+              <a:t>2013-12-20</a:t>
             </a:fld>
             <a:endParaRPr lang="pl-PL"/>
           </a:p>
@@ -1054,7 +1059,7 @@
             <a:fld id="{9E579FCD-C7FB-4CDF-8CA4-138E1F44076D}" type="datetimeFigureOut">
               <a:rPr lang="pl-PL" smtClean="0"/>
               <a:pPr/>
-              <a:t>2013-12-11</a:t>
+              <a:t>2013-12-20</a:t>
             </a:fld>
             <a:endParaRPr lang="pl-PL"/>
           </a:p>
@@ -1339,7 +1344,7 @@
             <a:fld id="{9E579FCD-C7FB-4CDF-8CA4-138E1F44076D}" type="datetimeFigureOut">
               <a:rPr lang="pl-PL" smtClean="0"/>
               <a:pPr/>
-              <a:t>2013-12-11</a:t>
+              <a:t>2013-12-20</a:t>
             </a:fld>
             <a:endParaRPr lang="pl-PL"/>
           </a:p>
@@ -1758,7 +1763,7 @@
             <a:fld id="{9E579FCD-C7FB-4CDF-8CA4-138E1F44076D}" type="datetimeFigureOut">
               <a:rPr lang="pl-PL" smtClean="0"/>
               <a:pPr/>
-              <a:t>2013-12-11</a:t>
+              <a:t>2013-12-20</a:t>
             </a:fld>
             <a:endParaRPr lang="pl-PL"/>
           </a:p>
@@ -1873,7 +1878,7 @@
             <a:fld id="{9E579FCD-C7FB-4CDF-8CA4-138E1F44076D}" type="datetimeFigureOut">
               <a:rPr lang="pl-PL" smtClean="0"/>
               <a:pPr/>
-              <a:t>2013-12-11</a:t>
+              <a:t>2013-12-20</a:t>
             </a:fld>
             <a:endParaRPr lang="pl-PL"/>
           </a:p>
@@ -1965,7 +1970,7 @@
             <a:fld id="{9E579FCD-C7FB-4CDF-8CA4-138E1F44076D}" type="datetimeFigureOut">
               <a:rPr lang="pl-PL" smtClean="0"/>
               <a:pPr/>
-              <a:t>2013-12-11</a:t>
+              <a:t>2013-12-20</a:t>
             </a:fld>
             <a:endParaRPr lang="pl-PL"/>
           </a:p>
@@ -2239,7 +2244,7 @@
             <a:fld id="{9E579FCD-C7FB-4CDF-8CA4-138E1F44076D}" type="datetimeFigureOut">
               <a:rPr lang="pl-PL" smtClean="0"/>
               <a:pPr/>
-              <a:t>2013-12-11</a:t>
+              <a:t>2013-12-20</a:t>
             </a:fld>
             <a:endParaRPr lang="pl-PL"/>
           </a:p>
@@ -2489,7 +2494,7 @@
             <a:fld id="{9E579FCD-C7FB-4CDF-8CA4-138E1F44076D}" type="datetimeFigureOut">
               <a:rPr lang="pl-PL" smtClean="0"/>
               <a:pPr/>
-              <a:t>2013-12-11</a:t>
+              <a:t>2013-12-20</a:t>
             </a:fld>
             <a:endParaRPr lang="pl-PL"/>
           </a:p>
@@ -2699,7 +2704,7 @@
             <a:fld id="{9E579FCD-C7FB-4CDF-8CA4-138E1F44076D}" type="datetimeFigureOut">
               <a:rPr lang="pl-PL" smtClean="0"/>
               <a:pPr/>
-              <a:t>2013-12-11</a:t>
+              <a:t>2013-12-20</a:t>
             </a:fld>
             <a:endParaRPr lang="pl-PL"/>
           </a:p>
@@ -3673,6 +3678,489 @@
 </p:sld>
 </file>
 
+<file path=ppt/slides/slide13.xml><?xml version="1.0" encoding="utf-8"?>
+<p:sld xmlns:a="http://schemas.openxmlformats.org/drawingml/2006/main" xmlns:r="http://schemas.openxmlformats.org/officeDocument/2006/relationships" xmlns:p="http://schemas.openxmlformats.org/presentationml/2006/main">
+  <p:cSld>
+    <p:spTree>
+      <p:nvGrpSpPr>
+        <p:cNvPr id="1" name=""/>
+        <p:cNvGrpSpPr/>
+        <p:nvPr/>
+      </p:nvGrpSpPr>
+      <p:grpSpPr>
+        <a:xfrm>
+          <a:off x="0" y="0"/>
+          <a:ext cx="0" cy="0"/>
+          <a:chOff x="0" y="0"/>
+          <a:chExt cx="0" cy="0"/>
+        </a:xfrm>
+      </p:grpSpPr>
+      <p:sp>
+        <p:nvSpPr>
+          <p:cNvPr id="2" name="Title 1"/>
+          <p:cNvSpPr>
+            <a:spLocks noGrp="1"/>
+          </p:cNvSpPr>
+          <p:nvPr>
+            <p:ph type="title"/>
+          </p:nvPr>
+        </p:nvSpPr>
+        <p:spPr/>
+        <p:txBody>
+          <a:bodyPr/>
+          <a:lstStyle/>
+          <a:p>
+            <a:r>
+              <a:rPr lang="pl-PL" dirty="0" smtClean="0"/>
+              <a:t>Domain logic</a:t>
+            </a:r>
+            <a:endParaRPr lang="en-US" dirty="0"/>
+          </a:p>
+        </p:txBody>
+      </p:sp>
+      <p:sp>
+        <p:nvSpPr>
+          <p:cNvPr id="3" name="Content Placeholder 2"/>
+          <p:cNvSpPr>
+            <a:spLocks noGrp="1"/>
+          </p:cNvSpPr>
+          <p:nvPr>
+            <p:ph idx="1"/>
+          </p:nvPr>
+        </p:nvSpPr>
+        <p:spPr/>
+        <p:txBody>
+          <a:bodyPr/>
+          <a:lstStyle/>
+          <a:p>
+            <a:r>
+              <a:rPr lang="pl-PL" dirty="0" smtClean="0"/>
+              <a:t>Computations, data processing, rules, decision making</a:t>
+            </a:r>
+            <a:endParaRPr lang="en-US" dirty="0"/>
+          </a:p>
+        </p:txBody>
+      </p:sp>
+    </p:spTree>
+  </p:cSld>
+  <p:clrMapOvr>
+    <a:masterClrMapping/>
+  </p:clrMapOvr>
+</p:sld>
+</file>
+
+<file path=ppt/slides/slide14.xml><?xml version="1.0" encoding="utf-8"?>
+<p:sld xmlns:a="http://schemas.openxmlformats.org/drawingml/2006/main" xmlns:r="http://schemas.openxmlformats.org/officeDocument/2006/relationships" xmlns:p="http://schemas.openxmlformats.org/presentationml/2006/main">
+  <p:cSld>
+    <p:spTree>
+      <p:nvGrpSpPr>
+        <p:cNvPr id="1" name=""/>
+        <p:cNvGrpSpPr/>
+        <p:nvPr/>
+      </p:nvGrpSpPr>
+      <p:grpSpPr>
+        <a:xfrm>
+          <a:off x="0" y="0"/>
+          <a:ext cx="0" cy="0"/>
+          <a:chOff x="0" y="0"/>
+          <a:chExt cx="0" cy="0"/>
+        </a:xfrm>
+      </p:grpSpPr>
+      <p:sp>
+        <p:nvSpPr>
+          <p:cNvPr id="2" name="Title 1"/>
+          <p:cNvSpPr>
+            <a:spLocks noGrp="1"/>
+          </p:cNvSpPr>
+          <p:nvPr>
+            <p:ph type="title"/>
+          </p:nvPr>
+        </p:nvSpPr>
+        <p:spPr/>
+        <p:txBody>
+          <a:bodyPr/>
+          <a:lstStyle/>
+          <a:p>
+            <a:r>
+              <a:rPr lang="pl-PL" dirty="0" smtClean="0"/>
+              <a:t>Transaction script</a:t>
+            </a:r>
+            <a:endParaRPr lang="en-US" dirty="0"/>
+          </a:p>
+        </p:txBody>
+      </p:sp>
+      <p:sp>
+        <p:nvSpPr>
+          <p:cNvPr id="3" name="Content Placeholder 2"/>
+          <p:cNvSpPr>
+            <a:spLocks noGrp="1"/>
+          </p:cNvSpPr>
+          <p:nvPr>
+            <p:ph idx="1"/>
+          </p:nvPr>
+        </p:nvSpPr>
+        <p:spPr/>
+        <p:txBody>
+          <a:bodyPr/>
+          <a:lstStyle/>
+          <a:p>
+            <a:r>
+              <a:rPr lang="pl-PL" dirty="0" smtClean="0"/>
+              <a:t>Implemented as set of (sub)procedures which</a:t>
+            </a:r>
+          </a:p>
+          <a:p>
+            <a:r>
+              <a:rPr lang="pl-PL" dirty="0" smtClean="0"/>
+              <a:t>Correspond to single user activity / use case</a:t>
+            </a:r>
+          </a:p>
+          <a:p>
+            <a:r>
+              <a:rPr lang="pl-PL" dirty="0" smtClean="0"/>
+              <a:t>Good for simple business logic</a:t>
+            </a:r>
+          </a:p>
+          <a:p>
+            <a:endParaRPr lang="en-US" dirty="0"/>
+          </a:p>
+        </p:txBody>
+      </p:sp>
+    </p:spTree>
+  </p:cSld>
+  <p:clrMapOvr>
+    <a:masterClrMapping/>
+  </p:clrMapOvr>
+</p:sld>
+</file>
+
+<file path=ppt/slides/slide15.xml><?xml version="1.0" encoding="utf-8"?>
+<p:sld xmlns:a="http://schemas.openxmlformats.org/drawingml/2006/main" xmlns:r="http://schemas.openxmlformats.org/officeDocument/2006/relationships" xmlns:p="http://schemas.openxmlformats.org/presentationml/2006/main">
+  <p:cSld>
+    <p:spTree>
+      <p:nvGrpSpPr>
+        <p:cNvPr id="1" name=""/>
+        <p:cNvGrpSpPr/>
+        <p:nvPr/>
+      </p:nvGrpSpPr>
+      <p:grpSpPr>
+        <a:xfrm>
+          <a:off x="0" y="0"/>
+          <a:ext cx="0" cy="0"/>
+          <a:chOff x="0" y="0"/>
+          <a:chExt cx="0" cy="0"/>
+        </a:xfrm>
+      </p:grpSpPr>
+      <p:sp>
+        <p:nvSpPr>
+          <p:cNvPr id="2" name="Title 1"/>
+          <p:cNvSpPr>
+            <a:spLocks noGrp="1"/>
+          </p:cNvSpPr>
+          <p:nvPr>
+            <p:ph type="title"/>
+          </p:nvPr>
+        </p:nvSpPr>
+        <p:spPr/>
+        <p:txBody>
+          <a:bodyPr/>
+          <a:lstStyle/>
+          <a:p>
+            <a:r>
+              <a:rPr lang="pl-PL" dirty="0" smtClean="0"/>
+              <a:t>Transaction script</a:t>
+            </a:r>
+            <a:endParaRPr lang="en-US" dirty="0"/>
+          </a:p>
+        </p:txBody>
+      </p:sp>
+      <p:sp>
+        <p:nvSpPr>
+          <p:cNvPr id="3" name="Content Placeholder 2"/>
+          <p:cNvSpPr>
+            <a:spLocks noGrp="1"/>
+          </p:cNvSpPr>
+          <p:nvPr>
+            <p:ph idx="1"/>
+          </p:nvPr>
+        </p:nvSpPr>
+        <p:spPr/>
+        <p:txBody>
+          <a:bodyPr>
+            <a:normAutofit lnSpcReduction="10000"/>
+          </a:bodyPr>
+          <a:lstStyle/>
+          <a:p>
+            <a:r>
+              <a:rPr lang="pl-PL" dirty="0" smtClean="0"/>
+              <a:t>Pros:</a:t>
+            </a:r>
+          </a:p>
+          <a:p>
+            <a:pPr lvl="1"/>
+            <a:r>
+              <a:rPr lang="pl-PL" dirty="0" smtClean="0"/>
+              <a:t>Simplicity</a:t>
+            </a:r>
+          </a:p>
+          <a:p>
+            <a:pPr lvl="1"/>
+            <a:r>
+              <a:rPr lang="pl-PL" dirty="0" smtClean="0"/>
+              <a:t>Defining beggining and end of transaction is easy</a:t>
+            </a:r>
+          </a:p>
+          <a:p>
+            <a:pPr lvl="1"/>
+            <a:r>
+              <a:rPr lang="pl-PL" dirty="0" smtClean="0"/>
+              <a:t>Usage of Table Data Gateway and Row Data Gateway is </a:t>
+            </a:r>
+            <a:r>
+              <a:rPr lang="pl-PL" dirty="0" smtClean="0"/>
+              <a:t>easy</a:t>
+            </a:r>
+          </a:p>
+          <a:p>
+            <a:r>
+              <a:rPr lang="pl-PL" dirty="0" smtClean="0"/>
+              <a:t>Cons:</a:t>
+            </a:r>
+          </a:p>
+          <a:p>
+            <a:pPr lvl="1"/>
+            <a:r>
+              <a:rPr lang="pl-PL" dirty="0" smtClean="0"/>
+              <a:t>Good only for simple logic, complex logic is overly complexed...</a:t>
+            </a:r>
+          </a:p>
+          <a:p>
+            <a:pPr lvl="1"/>
+            <a:r>
+              <a:rPr lang="pl-PL" dirty="0" smtClean="0"/>
+              <a:t>Code repetition, difficult to avoid and eliminate</a:t>
+            </a:r>
+            <a:endParaRPr lang="en-US" dirty="0"/>
+          </a:p>
+        </p:txBody>
+      </p:sp>
+    </p:spTree>
+  </p:cSld>
+  <p:clrMapOvr>
+    <a:masterClrMapping/>
+  </p:clrMapOvr>
+</p:sld>
+</file>
+
+<file path=ppt/slides/slide16.xml><?xml version="1.0" encoding="utf-8"?>
+<p:sld xmlns:a="http://schemas.openxmlformats.org/drawingml/2006/main" xmlns:r="http://schemas.openxmlformats.org/officeDocument/2006/relationships" xmlns:p="http://schemas.openxmlformats.org/presentationml/2006/main">
+  <p:cSld>
+    <p:spTree>
+      <p:nvGrpSpPr>
+        <p:cNvPr id="1" name=""/>
+        <p:cNvGrpSpPr/>
+        <p:nvPr/>
+      </p:nvGrpSpPr>
+      <p:grpSpPr>
+        <a:xfrm>
+          <a:off x="0" y="0"/>
+          <a:ext cx="0" cy="0"/>
+          <a:chOff x="0" y="0"/>
+          <a:chExt cx="0" cy="0"/>
+        </a:xfrm>
+      </p:grpSpPr>
+      <p:sp>
+        <p:nvSpPr>
+          <p:cNvPr id="2" name="Title 1"/>
+          <p:cNvSpPr>
+            <a:spLocks noGrp="1"/>
+          </p:cNvSpPr>
+          <p:nvPr>
+            <p:ph type="title"/>
+          </p:nvPr>
+        </p:nvSpPr>
+        <p:spPr/>
+        <p:txBody>
+          <a:bodyPr>
+            <a:normAutofit/>
+          </a:bodyPr>
+          <a:lstStyle/>
+          <a:p>
+            <a:r>
+              <a:rPr lang="pl-PL" dirty="0" smtClean="0"/>
+              <a:t>Domain Model</a:t>
+            </a:r>
+            <a:endParaRPr lang="en-US" dirty="0"/>
+          </a:p>
+        </p:txBody>
+      </p:sp>
+      <p:sp>
+        <p:nvSpPr>
+          <p:cNvPr id="3" name="Content Placeholder 2"/>
+          <p:cNvSpPr>
+            <a:spLocks noGrp="1"/>
+          </p:cNvSpPr>
+          <p:nvPr>
+            <p:ph idx="1"/>
+          </p:nvPr>
+        </p:nvSpPr>
+        <p:spPr/>
+        <p:txBody>
+          <a:bodyPr/>
+          <a:lstStyle/>
+          <a:p>
+            <a:r>
+              <a:rPr lang="pl-PL" dirty="0" smtClean="0"/>
+              <a:t>Object-oriented design applied for domain logic</a:t>
+            </a:r>
+          </a:p>
+          <a:p>
+            <a:r>
+              <a:rPr lang="pl-PL" dirty="0" smtClean="0"/>
+              <a:t>Addresses complexed business logic</a:t>
+            </a:r>
+          </a:p>
+        </p:txBody>
+      </p:sp>
+    </p:spTree>
+  </p:cSld>
+  <p:clrMapOvr>
+    <a:masterClrMapping/>
+  </p:clrMapOvr>
+</p:sld>
+</file>
+
+<file path=ppt/slides/slide17.xml><?xml version="1.0" encoding="utf-8"?>
+<p:sld xmlns:a="http://schemas.openxmlformats.org/drawingml/2006/main" xmlns:r="http://schemas.openxmlformats.org/officeDocument/2006/relationships" xmlns:p="http://schemas.openxmlformats.org/presentationml/2006/main">
+  <p:cSld>
+    <p:spTree>
+      <p:nvGrpSpPr>
+        <p:cNvPr id="1" name=""/>
+        <p:cNvGrpSpPr/>
+        <p:nvPr/>
+      </p:nvGrpSpPr>
+      <p:grpSpPr>
+        <a:xfrm>
+          <a:off x="0" y="0"/>
+          <a:ext cx="0" cy="0"/>
+          <a:chOff x="0" y="0"/>
+          <a:chExt cx="0" cy="0"/>
+        </a:xfrm>
+      </p:grpSpPr>
+      <p:sp>
+        <p:nvSpPr>
+          <p:cNvPr id="2" name="Title 1"/>
+          <p:cNvSpPr>
+            <a:spLocks noGrp="1"/>
+          </p:cNvSpPr>
+          <p:nvPr>
+            <p:ph type="title"/>
+          </p:nvPr>
+        </p:nvSpPr>
+        <p:spPr/>
+        <p:txBody>
+          <a:bodyPr/>
+          <a:lstStyle/>
+          <a:p>
+            <a:r>
+              <a:rPr lang="pl-PL" dirty="0" smtClean="0"/>
+              <a:t>Domain Model</a:t>
+            </a:r>
+            <a:endParaRPr lang="en-US" dirty="0"/>
+          </a:p>
+        </p:txBody>
+      </p:sp>
+      <p:sp>
+        <p:nvSpPr>
+          <p:cNvPr id="3" name="Content Placeholder 2"/>
+          <p:cNvSpPr>
+            <a:spLocks noGrp="1"/>
+          </p:cNvSpPr>
+          <p:nvPr>
+            <p:ph idx="1"/>
+          </p:nvPr>
+        </p:nvSpPr>
+        <p:spPr/>
+        <p:txBody>
+          <a:bodyPr/>
+          <a:lstStyle/>
+          <a:p>
+            <a:r>
+              <a:rPr lang="pl-PL" dirty="0" smtClean="0"/>
+              <a:t>Pros:</a:t>
+            </a:r>
+          </a:p>
+          <a:p>
+            <a:pPr lvl="1"/>
+            <a:r>
+              <a:rPr lang="pl-PL" dirty="0" smtClean="0"/>
+              <a:t>All advantages of </a:t>
+            </a:r>
+            <a:r>
+              <a:rPr lang="pl-PL" dirty="0" smtClean="0"/>
+              <a:t>OOD</a:t>
+            </a:r>
+          </a:p>
+          <a:p>
+            <a:pPr lvl="1"/>
+            <a:r>
+              <a:rPr lang="pl-PL" dirty="0" smtClean="0"/>
+              <a:t>Extensibility</a:t>
+            </a:r>
+          </a:p>
+          <a:p>
+            <a:pPr lvl="1"/>
+            <a:r>
+              <a:rPr lang="pl-PL" dirty="0" smtClean="0"/>
+              <a:t>Better testability</a:t>
+            </a:r>
+          </a:p>
+          <a:p>
+            <a:pPr lvl="1"/>
+            <a:r>
+              <a:rPr lang="pl-PL" dirty="0" smtClean="0"/>
+              <a:t>Design patterns</a:t>
+            </a:r>
+          </a:p>
+          <a:p>
+            <a:pPr lvl="1"/>
+            <a:r>
+              <a:rPr lang="pl-PL" dirty="0" smtClean="0"/>
+              <a:t>Guidelines for </a:t>
+            </a:r>
+            <a:r>
+              <a:rPr lang="pl-PL" smtClean="0"/>
+              <a:t>tackling complexity</a:t>
+            </a:r>
+            <a:endParaRPr lang="pl-PL" dirty="0" smtClean="0"/>
+          </a:p>
+          <a:p>
+            <a:r>
+              <a:rPr lang="pl-PL" dirty="0" smtClean="0"/>
+              <a:t>Cons:</a:t>
+            </a:r>
+          </a:p>
+          <a:p>
+            <a:pPr lvl="1"/>
+            <a:r>
+              <a:rPr lang="pl-PL" dirty="0" smtClean="0"/>
+              <a:t>Complexity</a:t>
+            </a:r>
+            <a:endParaRPr lang="en-US" dirty="0" smtClean="0"/>
+          </a:p>
+          <a:p>
+            <a:endParaRPr lang="en-US" dirty="0"/>
+          </a:p>
+        </p:txBody>
+      </p:sp>
+    </p:spTree>
+  </p:cSld>
+  <p:clrMapOvr>
+    <a:masterClrMapping/>
+  </p:clrMapOvr>
+</p:sld>
+</file>
+
 <file path=ppt/slides/slide2.xml><?xml version="1.0" encoding="utf-8"?>
 <p:sld xmlns:a="http://schemas.openxmlformats.org/drawingml/2006/main" xmlns:r="http://schemas.openxmlformats.org/officeDocument/2006/relationships" xmlns:p="http://schemas.openxmlformats.org/presentationml/2006/main">
   <p:cSld>
@@ -3994,19 +4482,7 @@
             </a:r>
             <a:r>
               <a:rPr lang="en-US" dirty="0" smtClean="0"/>
-              <a:t> are </a:t>
-            </a:r>
-            <a:r>
-              <a:rPr lang="en-US" dirty="0" smtClean="0"/>
-              <a:t>a </a:t>
-            </a:r>
-            <a:r>
-              <a:rPr lang="en-US" dirty="0" smtClean="0"/>
-              <a:t>way of organizing </a:t>
-            </a:r>
-            <a:r>
-              <a:rPr lang="en-US" dirty="0" smtClean="0"/>
-              <a:t>code</a:t>
+              <a:t> are a way of organizing code</a:t>
             </a:r>
             <a:endParaRPr lang="pl-PL" dirty="0" smtClean="0"/>
           </a:p>
@@ -4037,19 +4513,7 @@
             </a:r>
             <a:r>
               <a:rPr lang="en-US" dirty="0" smtClean="0"/>
-              <a:t> </a:t>
-            </a:r>
-            <a:r>
-              <a:rPr lang="en-US" dirty="0" smtClean="0"/>
-              <a:t>are only about </a:t>
-            </a:r>
-            <a:r>
-              <a:rPr lang="en-US" dirty="0" smtClean="0"/>
-              <a:t>where the code </a:t>
-            </a:r>
-            <a:r>
-              <a:rPr lang="en-US" dirty="0" smtClean="0"/>
-              <a:t>runs</a:t>
+              <a:t> are only about where the code runs</a:t>
             </a:r>
             <a:r>
               <a:rPr lang="pl-PL" dirty="0" smtClean="0"/>
@@ -4061,11 +4525,7 @@
             </a:r>
             <a:r>
               <a:rPr lang="en-US" dirty="0" smtClean="0"/>
-              <a:t> </a:t>
-            </a:r>
-            <a:r>
-              <a:rPr lang="en-US" dirty="0" smtClean="0"/>
-              <a:t>are places where layers are deployed</a:t>
+              <a:t> are places where layers are deployed</a:t>
             </a:r>
             <a:endParaRPr lang="pl-PL" dirty="0"/>
           </a:p>

</xml_diff>